<commit_message>
updated from old laptop
Signed-off-by: Albert <wensinlor@gmail.com>
</commit_message>
<xml_diff>
--- a/Meeting_Materials/Ergonomics Semester 2 Week 9.pptx
+++ b/Meeting_Materials/Ergonomics Semester 2 Week 9.pptx
@@ -5,7 +5,7 @@
     <p:sldMasterId id="2147483710" r:id="rId4"/>
   </p:sldMasterIdLst>
   <p:notesMasterIdLst>
-    <p:notesMasterId r:id="rId14"/>
+    <p:notesMasterId r:id="rId16"/>
   </p:notesMasterIdLst>
   <p:sldIdLst>
     <p:sldId id="257" r:id="rId5"/>
@@ -13,10 +13,12 @@
     <p:sldId id="259" r:id="rId7"/>
     <p:sldId id="273" r:id="rId8"/>
     <p:sldId id="274" r:id="rId9"/>
-    <p:sldId id="275" r:id="rId10"/>
-    <p:sldId id="276" r:id="rId11"/>
-    <p:sldId id="268" r:id="rId12"/>
-    <p:sldId id="269" r:id="rId13"/>
+    <p:sldId id="277" r:id="rId10"/>
+    <p:sldId id="278" r:id="rId11"/>
+    <p:sldId id="275" r:id="rId12"/>
+    <p:sldId id="276" r:id="rId13"/>
+    <p:sldId id="268" r:id="rId14"/>
+    <p:sldId id="269" r:id="rId15"/>
   </p:sldIdLst>
   <p:sldSz cx="12192000" cy="6858000"/>
   <p:notesSz cx="6858000" cy="9144000"/>
@@ -211,7 +213,7 @@
           <a:p>
             <a:fld id="{22B1E1AC-897E-4258-89CC-349F958F3456}" type="datetimeFigureOut">
               <a:rPr lang="en-US" smtClean="0"/>
-              <a:t>3/12/2023</a:t>
+              <a:t>3/17/2023</a:t>
             </a:fld>
             <a:endParaRPr lang="en-US"/>
           </a:p>
@@ -585,7 +587,7 @@
           <a:p>
             <a:fld id="{032246CF-3E64-44D5-82D2-E6C647CC0300}" type="datetime1">
               <a:rPr lang="en-US" smtClean="0"/>
-              <a:t>3/12/2023</a:t>
+              <a:t>3/17/2023</a:t>
             </a:fld>
             <a:endParaRPr lang="en-US"/>
           </a:p>
@@ -1113,7 +1115,7 @@
           <a:p>
             <a:fld id="{3753495E-55A6-46D8-A35E-192AB95FCC1E}" type="datetime1">
               <a:rPr lang="en-US" smtClean="0"/>
-              <a:t>3/12/2023</a:t>
+              <a:t>3/17/2023</a:t>
             </a:fld>
             <a:endParaRPr lang="en-US"/>
           </a:p>
@@ -1463,7 +1465,7 @@
           <a:p>
             <a:fld id="{7565C209-6024-4AE8-994C-64E567FE647E}" type="datetime1">
               <a:rPr lang="en-US" smtClean="0"/>
-              <a:t>3/12/2023</a:t>
+              <a:t>3/17/2023</a:t>
             </a:fld>
             <a:endParaRPr lang="en-US"/>
           </a:p>
@@ -2533,6 +2535,289 @@
 </p:sld>
 </file>
 
+<file path=ppt/slides/slide10.xml><?xml version="1.0" encoding="utf-8"?>
+<p:sld xmlns:a="http://schemas.openxmlformats.org/drawingml/2006/main" xmlns:r="http://schemas.openxmlformats.org/officeDocument/2006/relationships" xmlns:p="http://schemas.openxmlformats.org/presentationml/2006/main">
+  <p:cSld>
+    <p:spTree>
+      <p:nvGrpSpPr>
+        <p:cNvPr id="1" name=""/>
+        <p:cNvGrpSpPr/>
+        <p:nvPr/>
+      </p:nvGrpSpPr>
+      <p:grpSpPr>
+        <a:xfrm>
+          <a:off x="0" y="0"/>
+          <a:ext cx="0" cy="0"/>
+          <a:chOff x="0" y="0"/>
+          <a:chExt cx="0" cy="0"/>
+        </a:xfrm>
+      </p:grpSpPr>
+      <p:sp>
+        <p:nvSpPr>
+          <p:cNvPr id="2" name="Title 1">
+            <a:extLst>
+              <a:ext uri="{FF2B5EF4-FFF2-40B4-BE49-F238E27FC236}">
+                <a16:creationId xmlns:a16="http://schemas.microsoft.com/office/drawing/2014/main" id="{7A52E233-DA80-5A3A-534F-8A98B545F1D9}"/>
+              </a:ext>
+            </a:extLst>
+          </p:cNvPr>
+          <p:cNvSpPr>
+            <a:spLocks noGrp="1"/>
+          </p:cNvSpPr>
+          <p:nvPr>
+            <p:ph type="title"/>
+          </p:nvPr>
+        </p:nvSpPr>
+        <p:spPr/>
+        <p:txBody>
+          <a:bodyPr/>
+          <a:lstStyle/>
+          <a:p>
+            <a:r>
+              <a:rPr lang="en-MY"/>
+              <a:t>Challenges of This Week</a:t>
+            </a:r>
+            <a:endParaRPr lang="en-US"/>
+          </a:p>
+        </p:txBody>
+      </p:sp>
+      <p:sp>
+        <p:nvSpPr>
+          <p:cNvPr id="3" name="Slide Number Placeholder 2">
+            <a:extLst>
+              <a:ext uri="{FF2B5EF4-FFF2-40B4-BE49-F238E27FC236}">
+                <a16:creationId xmlns:a16="http://schemas.microsoft.com/office/drawing/2014/main" id="{3301FDD1-104B-C9B8-98AD-09C0483E990B}"/>
+              </a:ext>
+            </a:extLst>
+          </p:cNvPr>
+          <p:cNvSpPr>
+            <a:spLocks noGrp="1"/>
+          </p:cNvSpPr>
+          <p:nvPr>
+            <p:ph type="sldNum" sz="quarter" idx="12"/>
+          </p:nvPr>
+        </p:nvSpPr>
+        <p:spPr/>
+        <p:txBody>
+          <a:bodyPr/>
+          <a:lstStyle/>
+          <a:p>
+            <a:fld id="{34B7E4EF-A1BD-40F4-AB7B-04F084DD991D}" type="slidenum">
+              <a:rPr lang="en-US" smtClean="0"/>
+              <a:t>10</a:t>
+            </a:fld>
+            <a:endParaRPr lang="en-US"/>
+          </a:p>
+        </p:txBody>
+      </p:sp>
+      <p:sp>
+        <p:nvSpPr>
+          <p:cNvPr id="4" name="TextBox 3">
+            <a:extLst>
+              <a:ext uri="{FF2B5EF4-FFF2-40B4-BE49-F238E27FC236}">
+                <a16:creationId xmlns:a16="http://schemas.microsoft.com/office/drawing/2014/main" id="{7B46C7D6-9AA3-F564-4F35-B86153603C2F}"/>
+              </a:ext>
+            </a:extLst>
+          </p:cNvPr>
+          <p:cNvSpPr txBox="1"/>
+          <p:nvPr/>
+        </p:nvSpPr>
+        <p:spPr>
+          <a:xfrm>
+            <a:off x="1271443" y="1769915"/>
+            <a:ext cx="10392510" cy="465640"/>
+          </a:xfrm>
+          <a:prstGeom prst="rect">
+            <a:avLst/>
+          </a:prstGeom>
+          <a:noFill/>
+        </p:spPr>
+        <p:txBody>
+          <a:bodyPr wrap="square" rtlCol="0">
+            <a:spAutoFit/>
+          </a:bodyPr>
+          <a:lstStyle/>
+          <a:p>
+            <a:pPr marL="342900" indent="-342900">
+              <a:lnSpc>
+                <a:spcPct val="150000"/>
+              </a:lnSpc>
+              <a:buAutoNum type="arabicPeriod"/>
+            </a:pPr>
+            <a:r>
+              <a:rPr lang="en-US" dirty="0"/>
+              <a:t>Couldn’t find useful information for shoulder</a:t>
+            </a:r>
+          </a:p>
+        </p:txBody>
+      </p:sp>
+    </p:spTree>
+    <p:extLst>
+      <p:ext uri="{BB962C8B-B14F-4D97-AF65-F5344CB8AC3E}">
+        <p14:creationId xmlns:p14="http://schemas.microsoft.com/office/powerpoint/2010/main" val="440195292"/>
+      </p:ext>
+    </p:extLst>
+  </p:cSld>
+  <p:clrMapOvr>
+    <a:masterClrMapping/>
+  </p:clrMapOvr>
+</p:sld>
+</file>
+
+<file path=ppt/slides/slide11.xml><?xml version="1.0" encoding="utf-8"?>
+<p:sld xmlns:a="http://schemas.openxmlformats.org/drawingml/2006/main" xmlns:r="http://schemas.openxmlformats.org/officeDocument/2006/relationships" xmlns:p="http://schemas.openxmlformats.org/presentationml/2006/main">
+  <p:cSld>
+    <p:spTree>
+      <p:nvGrpSpPr>
+        <p:cNvPr id="1" name=""/>
+        <p:cNvGrpSpPr/>
+        <p:nvPr/>
+      </p:nvGrpSpPr>
+      <p:grpSpPr>
+        <a:xfrm>
+          <a:off x="0" y="0"/>
+          <a:ext cx="0" cy="0"/>
+          <a:chOff x="0" y="0"/>
+          <a:chExt cx="0" cy="0"/>
+        </a:xfrm>
+      </p:grpSpPr>
+      <p:sp>
+        <p:nvSpPr>
+          <p:cNvPr id="2" name="Title 1">
+            <a:extLst>
+              <a:ext uri="{FF2B5EF4-FFF2-40B4-BE49-F238E27FC236}">
+                <a16:creationId xmlns:a16="http://schemas.microsoft.com/office/drawing/2014/main" id="{7A52E233-DA80-5A3A-534F-8A98B545F1D9}"/>
+              </a:ext>
+            </a:extLst>
+          </p:cNvPr>
+          <p:cNvSpPr>
+            <a:spLocks noGrp="1"/>
+          </p:cNvSpPr>
+          <p:nvPr>
+            <p:ph type="title"/>
+          </p:nvPr>
+        </p:nvSpPr>
+        <p:spPr/>
+        <p:txBody>
+          <a:bodyPr/>
+          <a:lstStyle/>
+          <a:p>
+            <a:r>
+              <a:rPr lang="en-MY" dirty="0"/>
+              <a:t>Next Meeting</a:t>
+            </a:r>
+            <a:endParaRPr lang="en-US" dirty="0"/>
+          </a:p>
+        </p:txBody>
+      </p:sp>
+      <p:sp>
+        <p:nvSpPr>
+          <p:cNvPr id="6" name="TextBox 5">
+            <a:extLst>
+              <a:ext uri="{FF2B5EF4-FFF2-40B4-BE49-F238E27FC236}">
+                <a16:creationId xmlns:a16="http://schemas.microsoft.com/office/drawing/2014/main" id="{5CD50B1F-CE0D-FED6-70A2-576A7E6C8A86}"/>
+              </a:ext>
+            </a:extLst>
+          </p:cNvPr>
+          <p:cNvSpPr txBox="1"/>
+          <p:nvPr/>
+        </p:nvSpPr>
+        <p:spPr>
+          <a:xfrm>
+            <a:off x="839585" y="2014194"/>
+            <a:ext cx="10687130" cy="1477328"/>
+          </a:xfrm>
+          <a:prstGeom prst="rect">
+            <a:avLst/>
+          </a:prstGeom>
+          <a:noFill/>
+        </p:spPr>
+        <p:txBody>
+          <a:bodyPr wrap="square" rtlCol="0">
+            <a:spAutoFit/>
+          </a:bodyPr>
+          <a:lstStyle/>
+          <a:p>
+            <a:pPr marL="342900" indent="-342900">
+              <a:buAutoNum type="arabicPeriod"/>
+            </a:pPr>
+            <a:r>
+              <a:rPr lang="en-MY" dirty="0"/>
+              <a:t>URECA Video</a:t>
+            </a:r>
+          </a:p>
+          <a:p>
+            <a:pPr marL="342900" indent="-342900">
+              <a:buAutoNum type="arabicPeriod"/>
+            </a:pPr>
+            <a:r>
+              <a:rPr lang="en-MY" dirty="0"/>
+              <a:t>Research Paper</a:t>
+            </a:r>
+          </a:p>
+          <a:p>
+            <a:pPr marL="342900" indent="-342900">
+              <a:buAutoNum type="arabicPeriod"/>
+            </a:pPr>
+            <a:r>
+              <a:rPr lang="en-MY" dirty="0"/>
+              <a:t>Data Collection</a:t>
+            </a:r>
+          </a:p>
+          <a:p>
+            <a:pPr marL="342900" indent="-342900">
+              <a:buAutoNum type="arabicPeriod"/>
+            </a:pPr>
+            <a:r>
+              <a:rPr lang="en-MY" dirty="0"/>
+              <a:t>Judge the result in a qualitative way (common sense) and quantitative way( film another video with correct posture)</a:t>
+            </a:r>
+            <a:endParaRPr lang="en-US" dirty="0"/>
+          </a:p>
+        </p:txBody>
+      </p:sp>
+      <p:sp>
+        <p:nvSpPr>
+          <p:cNvPr id="3" name="Slide Number Placeholder 2">
+            <a:extLst>
+              <a:ext uri="{FF2B5EF4-FFF2-40B4-BE49-F238E27FC236}">
+                <a16:creationId xmlns:a16="http://schemas.microsoft.com/office/drawing/2014/main" id="{91D23FCB-73D4-C331-2251-938DEFF248B4}"/>
+              </a:ext>
+            </a:extLst>
+          </p:cNvPr>
+          <p:cNvSpPr>
+            <a:spLocks noGrp="1"/>
+          </p:cNvSpPr>
+          <p:nvPr>
+            <p:ph type="sldNum" sz="quarter" idx="12"/>
+          </p:nvPr>
+        </p:nvSpPr>
+        <p:spPr/>
+        <p:txBody>
+          <a:bodyPr/>
+          <a:lstStyle/>
+          <a:p>
+            <a:fld id="{34B7E4EF-A1BD-40F4-AB7B-04F084DD991D}" type="slidenum">
+              <a:rPr lang="en-US" smtClean="0"/>
+              <a:t>11</a:t>
+            </a:fld>
+            <a:endParaRPr lang="en-US"/>
+          </a:p>
+        </p:txBody>
+      </p:sp>
+    </p:spTree>
+    <p:extLst>
+      <p:ext uri="{BB962C8B-B14F-4D97-AF65-F5344CB8AC3E}">
+        <p14:creationId xmlns:p14="http://schemas.microsoft.com/office/powerpoint/2010/main" val="2699799663"/>
+      </p:ext>
+    </p:extLst>
+  </p:cSld>
+  <p:clrMapOvr>
+    <a:masterClrMapping/>
+  </p:clrMapOvr>
+</p:sld>
+</file>
+
 <file path=ppt/slides/slide2.xml><?xml version="1.0" encoding="utf-8"?>
 <p:sld xmlns:a="http://schemas.openxmlformats.org/drawingml/2006/main" xmlns:r="http://schemas.openxmlformats.org/officeDocument/2006/relationships" xmlns:p="http://schemas.openxmlformats.org/presentationml/2006/main">
   <p:cSld>
@@ -2594,7 +2879,7 @@
         <p:spPr>
           <a:xfrm>
             <a:off x="1396538" y="2014194"/>
-            <a:ext cx="8478982" cy="646331"/>
+            <a:ext cx="8478982" cy="923330"/>
           </a:xfrm>
           <a:prstGeom prst="rect">
             <a:avLst/>
@@ -2613,6 +2898,15 @@
             <a:r>
               <a:rPr lang="en-US" dirty="0"/>
               <a:t>Design an algorithm to handle stress, cumulative damage, and risk</a:t>
+            </a:r>
+          </a:p>
+          <a:p>
+            <a:pPr marL="342900" indent="-342900">
+              <a:buAutoNum type="arabicPeriod"/>
+            </a:pPr>
+            <a:r>
+              <a:rPr lang="en-US" dirty="0"/>
+              <a:t>Look for the shoulder information from 3dsspp research paper</a:t>
             </a:r>
           </a:p>
           <a:p>
@@ -5113,8 +5407,8 @@
         </p:nvSpPr>
         <p:spPr>
           <a:xfrm>
-            <a:off x="6864965" y="4051477"/>
-            <a:ext cx="1447925" cy="738554"/>
+            <a:off x="6817365" y="4051477"/>
+            <a:ext cx="1763496" cy="569278"/>
           </a:xfrm>
           <a:prstGeom prst="rect">
             <a:avLst/>
@@ -5165,7 +5459,7 @@
         </p:nvSpPr>
         <p:spPr>
           <a:xfrm>
-            <a:off x="6986592" y="4219947"/>
+            <a:off x="7037392" y="4148827"/>
             <a:ext cx="648532" cy="338554"/>
           </a:xfrm>
           <a:prstGeom prst="rect">
@@ -5205,8 +5499,8 @@
         </p:nvSpPr>
         <p:spPr>
           <a:xfrm>
-            <a:off x="7635124" y="4097465"/>
-            <a:ext cx="474636" cy="338554"/>
+            <a:off x="7754599" y="4148827"/>
+            <a:ext cx="727076" cy="338554"/>
           </a:xfrm>
           <a:prstGeom prst="rect">
             <a:avLst/>
@@ -5221,7 +5515,7 @@
           <a:p>
             <a:r>
               <a:rPr lang="en-MY" sz="1600" dirty="0"/>
-              <a:t>M</a:t>
+              <a:t>M + b</a:t>
             </a:r>
             <a:endParaRPr lang="en-US" sz="1600" dirty="0"/>
           </a:p>
@@ -5241,7 +5535,7 @@
         </p:nvSpPr>
         <p:spPr>
           <a:xfrm>
-            <a:off x="7696084" y="4349953"/>
+            <a:off x="7623310" y="4147458"/>
             <a:ext cx="278060" cy="338554"/>
           </a:xfrm>
           <a:prstGeom prst="rect">
@@ -5256,55 +5550,13 @@
           <a:lstStyle/>
           <a:p>
             <a:r>
-              <a:rPr lang="en-US" sz="1600" dirty="0"/>
+              <a:rPr lang="en-MY" sz="1600" dirty="0"/>
               <a:t>a</a:t>
             </a:r>
-          </a:p>
-        </p:txBody>
-      </p:sp>
-      <p:cxnSp>
-        <p:nvCxnSpPr>
-          <p:cNvPr id="24" name="Straight Connector 23">
-            <a:extLst>
-              <a:ext uri="{FF2B5EF4-FFF2-40B4-BE49-F238E27FC236}">
-                <a16:creationId xmlns:a16="http://schemas.microsoft.com/office/drawing/2014/main" id="{5770C383-4F92-9720-15FA-6DCB966365B7}"/>
-              </a:ext>
-            </a:extLst>
-          </p:cNvPr>
-          <p:cNvCxnSpPr>
-            <a:cxnSpLocks/>
-          </p:cNvCxnSpPr>
-          <p:nvPr/>
-        </p:nvCxnSpPr>
-        <p:spPr>
-          <a:xfrm>
-            <a:off x="7614804" y="4399384"/>
-            <a:ext cx="463279" cy="0"/>
-          </a:xfrm>
-          <a:prstGeom prst="line">
-            <a:avLst/>
-          </a:prstGeom>
-          <a:ln w="12700">
-            <a:solidFill>
-              <a:schemeClr val="tx1"/>
-            </a:solidFill>
-          </a:ln>
-        </p:spPr>
-        <p:style>
-          <a:lnRef idx="1">
-            <a:schemeClr val="accent1"/>
-          </a:lnRef>
-          <a:fillRef idx="0">
-            <a:schemeClr val="accent1"/>
-          </a:fillRef>
-          <a:effectRef idx="0">
-            <a:schemeClr val="accent1"/>
-          </a:effectRef>
-          <a:fontRef idx="minor">
-            <a:schemeClr val="tx1"/>
-          </a:fontRef>
-        </p:style>
-      </p:cxnSp>
+            <a:endParaRPr lang="en-US" sz="1600" dirty="0"/>
+          </a:p>
+        </p:txBody>
+      </p:sp>
       <p:sp>
         <p:nvSpPr>
           <p:cNvPr id="27" name="Rectangle 26">
@@ -5763,10 +6015,62 @@
       </p:sp>
       <p:sp>
         <p:nvSpPr>
-          <p:cNvPr id="153" name="TextBox 152">
-            <a:extLst>
-              <a:ext uri="{FF2B5EF4-FFF2-40B4-BE49-F238E27FC236}">
-                <a16:creationId xmlns:a16="http://schemas.microsoft.com/office/drawing/2014/main" id="{2806D040-4630-3135-9B3F-0064C65A4C2A}"/>
+          <p:cNvPr id="5" name="Rectangle 4">
+            <a:extLst>
+              <a:ext uri="{FF2B5EF4-FFF2-40B4-BE49-F238E27FC236}">
+                <a16:creationId xmlns:a16="http://schemas.microsoft.com/office/drawing/2014/main" id="{5C192F04-DC7A-7045-F170-F203E9AB07A8}"/>
+              </a:ext>
+            </a:extLst>
+          </p:cNvPr>
+          <p:cNvSpPr/>
+          <p:nvPr/>
+        </p:nvSpPr>
+        <p:spPr>
+          <a:xfrm>
+            <a:off x="2733040" y="1602942"/>
+            <a:ext cx="2237933" cy="501919"/>
+          </a:xfrm>
+          <a:prstGeom prst="rect">
+            <a:avLst/>
+          </a:prstGeom>
+          <a:solidFill>
+            <a:schemeClr val="accent2">
+              <a:lumMod val="20000"/>
+              <a:lumOff val="80000"/>
+            </a:schemeClr>
+          </a:solidFill>
+        </p:spPr>
+        <p:style>
+          <a:lnRef idx="2">
+            <a:schemeClr val="accent1">
+              <a:shade val="50000"/>
+            </a:schemeClr>
+          </a:lnRef>
+          <a:fillRef idx="1">
+            <a:schemeClr val="accent1"/>
+          </a:fillRef>
+          <a:effectRef idx="0">
+            <a:schemeClr val="accent1"/>
+          </a:effectRef>
+          <a:fontRef idx="minor">
+            <a:schemeClr val="lt1"/>
+          </a:fontRef>
+        </p:style>
+        <p:txBody>
+          <a:bodyPr rtlCol="0" anchor="ctr"/>
+          <a:lstStyle/>
+          <a:p>
+            <a:pPr algn="ctr"/>
+            <a:endParaRPr lang="en-US"/>
+          </a:p>
+        </p:txBody>
+      </p:sp>
+      <p:sp>
+        <p:nvSpPr>
+          <p:cNvPr id="6" name="TextBox 5">
+            <a:extLst>
+              <a:ext uri="{FF2B5EF4-FFF2-40B4-BE49-F238E27FC236}">
+                <a16:creationId xmlns:a16="http://schemas.microsoft.com/office/drawing/2014/main" id="{B6A5EE0E-86A8-5524-B320-4D7A960D4BCA}"/>
               </a:ext>
             </a:extLst>
           </p:cNvPr>
@@ -5775,8 +6079,8 @@
         </p:nvSpPr>
         <p:spPr>
           <a:xfrm>
-            <a:off x="698987" y="1423102"/>
-            <a:ext cx="2694453" cy="1200329"/>
+            <a:off x="2816858" y="1697433"/>
+            <a:ext cx="2154115" cy="338554"/>
           </a:xfrm>
           <a:prstGeom prst="rect">
             <a:avLst/>
@@ -5790,40 +6094,120 @@
           <a:lstStyle/>
           <a:p>
             <a:r>
-              <a:rPr lang="en-MY" b="1" dirty="0"/>
-              <a:t>a = 0.1</a:t>
-            </a:r>
-          </a:p>
-          <a:p>
-            <a:r>
-              <a:rPr lang="en-MY" b="1" dirty="0"/>
-              <a:t>Body weight = 600N</a:t>
-            </a:r>
-          </a:p>
-          <a:p>
-            <a:r>
-              <a:rPr lang="en-MY" b="1" dirty="0" err="1"/>
-              <a:t>cd_threshold</a:t>
-            </a:r>
-            <a:r>
-              <a:rPr lang="en-MY" b="1" dirty="0"/>
-              <a:t> = 0.3</a:t>
-            </a:r>
-          </a:p>
-          <a:p>
-            <a:r>
-              <a:rPr lang="en-MY" b="1" dirty="0"/>
-              <a:t>Load = 50N</a:t>
-            </a:r>
-          </a:p>
-        </p:txBody>
-      </p:sp>
-      <p:sp>
-        <p:nvSpPr>
-          <p:cNvPr id="11" name="TextBox 10">
-            <a:extLst>
-              <a:ext uri="{FF2B5EF4-FFF2-40B4-BE49-F238E27FC236}">
-                <a16:creationId xmlns:a16="http://schemas.microsoft.com/office/drawing/2014/main" id="{E93124ED-6702-EEB6-2185-00A5B0337F8F}"/>
+              <a:rPr lang="en-MY" sz="1600" dirty="0" err="1"/>
+              <a:t>US_shoulder</a:t>
+            </a:r>
+            <a:r>
+              <a:rPr lang="en-MY" sz="1600" dirty="0"/>
+              <a:t> = 115N</a:t>
+            </a:r>
+          </a:p>
+        </p:txBody>
+      </p:sp>
+      <p:sp>
+        <p:nvSpPr>
+          <p:cNvPr id="3" name="Arrow: Right 2">
+            <a:extLst>
+              <a:ext uri="{FF2B5EF4-FFF2-40B4-BE49-F238E27FC236}">
+                <a16:creationId xmlns:a16="http://schemas.microsoft.com/office/drawing/2014/main" id="{D4A42798-970C-3530-1F58-6629AE1E25DB}"/>
+              </a:ext>
+            </a:extLst>
+          </p:cNvPr>
+          <p:cNvSpPr/>
+          <p:nvPr/>
+        </p:nvSpPr>
+        <p:spPr>
+          <a:xfrm>
+            <a:off x="5261903" y="1584375"/>
+            <a:ext cx="949569" cy="483577"/>
+          </a:xfrm>
+          <a:prstGeom prst="rightArrow">
+            <a:avLst/>
+          </a:prstGeom>
+        </p:spPr>
+        <p:style>
+          <a:lnRef idx="2">
+            <a:schemeClr val="accent1">
+              <a:shade val="50000"/>
+            </a:schemeClr>
+          </a:lnRef>
+          <a:fillRef idx="1">
+            <a:schemeClr val="accent1"/>
+          </a:fillRef>
+          <a:effectRef idx="0">
+            <a:schemeClr val="accent1"/>
+          </a:effectRef>
+          <a:fontRef idx="minor">
+            <a:schemeClr val="lt1"/>
+          </a:fontRef>
+        </p:style>
+        <p:txBody>
+          <a:bodyPr rtlCol="0" anchor="ctr"/>
+          <a:lstStyle/>
+          <a:p>
+            <a:pPr algn="ctr"/>
+            <a:endParaRPr lang="en-US"/>
+          </a:p>
+        </p:txBody>
+      </p:sp>
+      <p:sp>
+        <p:nvSpPr>
+          <p:cNvPr id="7" name="Rectangle 6">
+            <a:extLst>
+              <a:ext uri="{FF2B5EF4-FFF2-40B4-BE49-F238E27FC236}">
+                <a16:creationId xmlns:a16="http://schemas.microsoft.com/office/drawing/2014/main" id="{5ECD111C-1009-E7E2-42C2-5AB5FFF65C7A}"/>
+              </a:ext>
+            </a:extLst>
+          </p:cNvPr>
+          <p:cNvSpPr/>
+          <p:nvPr/>
+        </p:nvSpPr>
+        <p:spPr>
+          <a:xfrm>
+            <a:off x="6666652" y="5313535"/>
+            <a:ext cx="1914209" cy="738554"/>
+          </a:xfrm>
+          <a:prstGeom prst="rect">
+            <a:avLst/>
+          </a:prstGeom>
+          <a:solidFill>
+            <a:schemeClr val="accent2">
+              <a:lumMod val="20000"/>
+              <a:lumOff val="80000"/>
+            </a:schemeClr>
+          </a:solidFill>
+        </p:spPr>
+        <p:style>
+          <a:lnRef idx="2">
+            <a:schemeClr val="accent1">
+              <a:shade val="50000"/>
+            </a:schemeClr>
+          </a:lnRef>
+          <a:fillRef idx="1">
+            <a:schemeClr val="accent1"/>
+          </a:fillRef>
+          <a:effectRef idx="0">
+            <a:schemeClr val="accent1"/>
+          </a:effectRef>
+          <a:fontRef idx="minor">
+            <a:schemeClr val="lt1"/>
+          </a:fontRef>
+        </p:style>
+        <p:txBody>
+          <a:bodyPr rtlCol="0" anchor="ctr"/>
+          <a:lstStyle/>
+          <a:p>
+            <a:pPr algn="ctr"/>
+            <a:endParaRPr lang="en-US"/>
+          </a:p>
+        </p:txBody>
+      </p:sp>
+      <p:sp>
+        <p:nvSpPr>
+          <p:cNvPr id="8" name="TextBox 7">
+            <a:extLst>
+              <a:ext uri="{FF2B5EF4-FFF2-40B4-BE49-F238E27FC236}">
+                <a16:creationId xmlns:a16="http://schemas.microsoft.com/office/drawing/2014/main" id="{EF402C1E-3B15-9F23-D657-F5520EAA0129}"/>
               </a:ext>
             </a:extLst>
           </p:cNvPr>
@@ -5832,8 +6216,8 @@
         </p:nvSpPr>
         <p:spPr>
           <a:xfrm>
-            <a:off x="6716321" y="1423102"/>
-            <a:ext cx="2694453" cy="1200329"/>
+            <a:off x="6732592" y="5482005"/>
+            <a:ext cx="1072661" cy="338554"/>
           </a:xfrm>
           <a:prstGeom prst="rect">
             <a:avLst/>
@@ -5847,96 +6231,889 @@
           <a:lstStyle/>
           <a:p>
             <a:r>
+              <a:rPr lang="en-MY" altLang="zh-CN" sz="1600" dirty="0"/>
+              <a:t>S </a:t>
+            </a:r>
+            <a:r>
+              <a:rPr lang="en-MY" sz="1600" dirty="0"/>
+              <a:t> = </a:t>
+            </a:r>
+            <a:endParaRPr lang="en-US" sz="1600" dirty="0"/>
+          </a:p>
+        </p:txBody>
+      </p:sp>
+      <p:sp>
+        <p:nvSpPr>
+          <p:cNvPr id="9" name="TextBox 8">
+            <a:extLst>
+              <a:ext uri="{FF2B5EF4-FFF2-40B4-BE49-F238E27FC236}">
+                <a16:creationId xmlns:a16="http://schemas.microsoft.com/office/drawing/2014/main" id="{74A6155E-048A-CFFC-5C99-52F2FDE5254B}"/>
+              </a:ext>
+            </a:extLst>
+          </p:cNvPr>
+          <p:cNvSpPr txBox="1"/>
+          <p:nvPr/>
+        </p:nvSpPr>
+        <p:spPr>
+          <a:xfrm>
+            <a:off x="7522625" y="5348703"/>
+            <a:ext cx="786330" cy="338554"/>
+          </a:xfrm>
+          <a:prstGeom prst="rect">
+            <a:avLst/>
+          </a:prstGeom>
+          <a:noFill/>
+        </p:spPr>
+        <p:txBody>
+          <a:bodyPr wrap="square" rtlCol="0">
+            <a:spAutoFit/>
+          </a:bodyPr>
+          <a:lstStyle/>
+          <a:p>
+            <a:r>
+              <a:rPr lang="en-MY" sz="1600" dirty="0"/>
+              <a:t>F + F ’ </a:t>
+            </a:r>
+            <a:endParaRPr lang="en-US" sz="1600" dirty="0"/>
+          </a:p>
+        </p:txBody>
+      </p:sp>
+      <p:sp>
+        <p:nvSpPr>
+          <p:cNvPr id="10" name="TextBox 9">
+            <a:extLst>
+              <a:ext uri="{FF2B5EF4-FFF2-40B4-BE49-F238E27FC236}">
+                <a16:creationId xmlns:a16="http://schemas.microsoft.com/office/drawing/2014/main" id="{94299D7E-4E24-464F-B1FF-F0BE94E5E835}"/>
+              </a:ext>
+            </a:extLst>
+          </p:cNvPr>
+          <p:cNvSpPr txBox="1"/>
+          <p:nvPr/>
+        </p:nvSpPr>
+        <p:spPr>
+          <a:xfrm>
+            <a:off x="7142480" y="5642491"/>
+            <a:ext cx="1405135" cy="338554"/>
+          </a:xfrm>
+          <a:prstGeom prst="rect">
+            <a:avLst/>
+          </a:prstGeom>
+          <a:noFill/>
+        </p:spPr>
+        <p:txBody>
+          <a:bodyPr wrap="square" rtlCol="0">
+            <a:spAutoFit/>
+          </a:bodyPr>
+          <a:lstStyle/>
+          <a:p>
+            <a:r>
+              <a:rPr lang="en-MY" sz="1600" dirty="0" err="1"/>
+              <a:t>US_shoulder</a:t>
+            </a:r>
+            <a:endParaRPr lang="en-US" sz="1600" dirty="0"/>
+          </a:p>
+        </p:txBody>
+      </p:sp>
+      <p:cxnSp>
+        <p:nvCxnSpPr>
+          <p:cNvPr id="12" name="Straight Connector 11">
+            <a:extLst>
+              <a:ext uri="{FF2B5EF4-FFF2-40B4-BE49-F238E27FC236}">
+                <a16:creationId xmlns:a16="http://schemas.microsoft.com/office/drawing/2014/main" id="{FFD296D3-FD3E-C685-37D0-CC1AF66AC4F9}"/>
+              </a:ext>
+            </a:extLst>
+          </p:cNvPr>
+          <p:cNvCxnSpPr>
+            <a:cxnSpLocks/>
+          </p:cNvCxnSpPr>
+          <p:nvPr/>
+        </p:nvCxnSpPr>
+        <p:spPr>
+          <a:xfrm>
+            <a:off x="7246453" y="5651282"/>
+            <a:ext cx="1157609" cy="0"/>
+          </a:xfrm>
+          <a:prstGeom prst="line">
+            <a:avLst/>
+          </a:prstGeom>
+          <a:ln w="12700">
+            <a:solidFill>
+              <a:schemeClr val="tx1"/>
+            </a:solidFill>
+          </a:ln>
+        </p:spPr>
+        <p:style>
+          <a:lnRef idx="1">
+            <a:schemeClr val="accent1"/>
+          </a:lnRef>
+          <a:fillRef idx="0">
+            <a:schemeClr val="accent1"/>
+          </a:fillRef>
+          <a:effectRef idx="0">
+            <a:schemeClr val="accent1"/>
+          </a:effectRef>
+          <a:fontRef idx="minor">
+            <a:schemeClr val="tx1"/>
+          </a:fontRef>
+        </p:style>
+      </p:cxnSp>
+      <p:sp>
+        <p:nvSpPr>
+          <p:cNvPr id="13" name="Rectangle 12">
+            <a:extLst>
+              <a:ext uri="{FF2B5EF4-FFF2-40B4-BE49-F238E27FC236}">
+                <a16:creationId xmlns:a16="http://schemas.microsoft.com/office/drawing/2014/main" id="{6D4CCC83-3E55-613B-9FBA-DF0659212ED5}"/>
+              </a:ext>
+            </a:extLst>
+          </p:cNvPr>
+          <p:cNvSpPr/>
+          <p:nvPr/>
+        </p:nvSpPr>
+        <p:spPr>
+          <a:xfrm>
+            <a:off x="6502403" y="1512107"/>
+            <a:ext cx="2154115" cy="738554"/>
+          </a:xfrm>
+          <a:prstGeom prst="rect">
+            <a:avLst/>
+          </a:prstGeom>
+          <a:solidFill>
+            <a:schemeClr val="accent2">
+              <a:lumMod val="20000"/>
+              <a:lumOff val="80000"/>
+            </a:schemeClr>
+          </a:solidFill>
+        </p:spPr>
+        <p:style>
+          <a:lnRef idx="2">
+            <a:schemeClr val="accent1">
+              <a:shade val="50000"/>
+            </a:schemeClr>
+          </a:lnRef>
+          <a:fillRef idx="1">
+            <a:schemeClr val="accent1"/>
+          </a:fillRef>
+          <a:effectRef idx="0">
+            <a:schemeClr val="accent1"/>
+          </a:effectRef>
+          <a:fontRef idx="minor">
+            <a:schemeClr val="lt1"/>
+          </a:fontRef>
+        </p:style>
+        <p:txBody>
+          <a:bodyPr rtlCol="0" anchor="ctr"/>
+          <a:lstStyle/>
+          <a:p>
+            <a:pPr algn="ctr"/>
+            <a:endParaRPr lang="en-US"/>
+          </a:p>
+        </p:txBody>
+      </p:sp>
+      <p:sp>
+        <p:nvSpPr>
+          <p:cNvPr id="14" name="TextBox 13">
+            <a:extLst>
+              <a:ext uri="{FF2B5EF4-FFF2-40B4-BE49-F238E27FC236}">
+                <a16:creationId xmlns:a16="http://schemas.microsoft.com/office/drawing/2014/main" id="{494D880D-159E-46B2-0483-D75A14ADE805}"/>
+              </a:ext>
+            </a:extLst>
+          </p:cNvPr>
+          <p:cNvSpPr txBox="1"/>
+          <p:nvPr/>
+        </p:nvSpPr>
+        <p:spPr>
+          <a:xfrm>
+            <a:off x="6624030" y="1680577"/>
+            <a:ext cx="1364276" cy="338554"/>
+          </a:xfrm>
+          <a:prstGeom prst="rect">
+            <a:avLst/>
+          </a:prstGeom>
+          <a:noFill/>
+        </p:spPr>
+        <p:txBody>
+          <a:bodyPr wrap="square" rtlCol="0">
+            <a:spAutoFit/>
+          </a:bodyPr>
+          <a:lstStyle/>
+          <a:p>
+            <a:r>
+              <a:rPr lang="en-US" altLang="zh-CN" sz="1600" dirty="0" err="1"/>
+              <a:t>σ_bending</a:t>
+            </a:r>
+            <a:r>
+              <a:rPr lang="en-MY" sz="1600" dirty="0"/>
+              <a:t> = </a:t>
+            </a:r>
+            <a:endParaRPr lang="en-US" sz="1600" dirty="0"/>
+          </a:p>
+        </p:txBody>
+      </p:sp>
+      <p:sp>
+        <p:nvSpPr>
+          <p:cNvPr id="15" name="TextBox 14">
+            <a:extLst>
+              <a:ext uri="{FF2B5EF4-FFF2-40B4-BE49-F238E27FC236}">
+                <a16:creationId xmlns:a16="http://schemas.microsoft.com/office/drawing/2014/main" id="{6F007A8A-5D2A-B6F7-A4DC-9CE316EC9FDB}"/>
+              </a:ext>
+            </a:extLst>
+          </p:cNvPr>
+          <p:cNvSpPr txBox="1"/>
+          <p:nvPr/>
+        </p:nvSpPr>
+        <p:spPr>
+          <a:xfrm>
+            <a:off x="8024402" y="1547935"/>
+            <a:ext cx="474636" cy="338554"/>
+          </a:xfrm>
+          <a:prstGeom prst="rect">
+            <a:avLst/>
+          </a:prstGeom>
+          <a:noFill/>
+        </p:spPr>
+        <p:txBody>
+          <a:bodyPr wrap="square" rtlCol="0">
+            <a:spAutoFit/>
+          </a:bodyPr>
+          <a:lstStyle/>
+          <a:p>
+            <a:r>
+              <a:rPr lang="en-MY" sz="1600" dirty="0"/>
+              <a:t>My</a:t>
+            </a:r>
+            <a:endParaRPr lang="en-US" sz="1600" dirty="0"/>
+          </a:p>
+        </p:txBody>
+      </p:sp>
+      <p:sp>
+        <p:nvSpPr>
+          <p:cNvPr id="16" name="TextBox 15">
+            <a:extLst>
+              <a:ext uri="{FF2B5EF4-FFF2-40B4-BE49-F238E27FC236}">
+                <a16:creationId xmlns:a16="http://schemas.microsoft.com/office/drawing/2014/main" id="{EA427193-7C51-4047-F4B2-38024B1AA56C}"/>
+              </a:ext>
+            </a:extLst>
+          </p:cNvPr>
+          <p:cNvSpPr txBox="1"/>
+          <p:nvPr/>
+        </p:nvSpPr>
+        <p:spPr>
+          <a:xfrm>
+            <a:off x="8126002" y="1841063"/>
+            <a:ext cx="278060" cy="338554"/>
+          </a:xfrm>
+          <a:prstGeom prst="rect">
+            <a:avLst/>
+          </a:prstGeom>
+          <a:noFill/>
+        </p:spPr>
+        <p:txBody>
+          <a:bodyPr wrap="square" rtlCol="0">
+            <a:spAutoFit/>
+          </a:bodyPr>
+          <a:lstStyle/>
+          <a:p>
+            <a:r>
+              <a:rPr lang="en-MY" sz="1600" dirty="0"/>
+              <a:t>I</a:t>
+            </a:r>
+            <a:endParaRPr lang="en-US" sz="1600" dirty="0"/>
+          </a:p>
+        </p:txBody>
+      </p:sp>
+      <p:cxnSp>
+        <p:nvCxnSpPr>
+          <p:cNvPr id="17" name="Straight Connector 16">
+            <a:extLst>
+              <a:ext uri="{FF2B5EF4-FFF2-40B4-BE49-F238E27FC236}">
+                <a16:creationId xmlns:a16="http://schemas.microsoft.com/office/drawing/2014/main" id="{B86D14F1-0338-BC4F-041A-672D7CE25D7D}"/>
+              </a:ext>
+            </a:extLst>
+          </p:cNvPr>
+          <p:cNvCxnSpPr>
+            <a:cxnSpLocks/>
+            <a:stCxn id="14" idx="3"/>
+          </p:cNvCxnSpPr>
+          <p:nvPr/>
+        </p:nvCxnSpPr>
+        <p:spPr>
+          <a:xfrm>
+            <a:off x="7988306" y="1849854"/>
+            <a:ext cx="513616" cy="0"/>
+          </a:xfrm>
+          <a:prstGeom prst="line">
+            <a:avLst/>
+          </a:prstGeom>
+          <a:ln w="12700">
+            <a:solidFill>
+              <a:schemeClr val="tx1"/>
+            </a:solidFill>
+          </a:ln>
+        </p:spPr>
+        <p:style>
+          <a:lnRef idx="1">
+            <a:schemeClr val="accent1"/>
+          </a:lnRef>
+          <a:fillRef idx="0">
+            <a:schemeClr val="accent1"/>
+          </a:fillRef>
+          <a:effectRef idx="0">
+            <a:schemeClr val="accent1"/>
+          </a:effectRef>
+          <a:fontRef idx="minor">
+            <a:schemeClr val="tx1"/>
+          </a:fontRef>
+        </p:style>
+      </p:cxnSp>
+      <p:sp>
+        <p:nvSpPr>
+          <p:cNvPr id="153" name="TextBox 152">
+            <a:extLst>
+              <a:ext uri="{FF2B5EF4-FFF2-40B4-BE49-F238E27FC236}">
+                <a16:creationId xmlns:a16="http://schemas.microsoft.com/office/drawing/2014/main" id="{2806D040-4630-3135-9B3F-0064C65A4C2A}"/>
+              </a:ext>
+            </a:extLst>
+          </p:cNvPr>
+          <p:cNvSpPr txBox="1"/>
+          <p:nvPr/>
+        </p:nvSpPr>
+        <p:spPr>
+          <a:xfrm>
+            <a:off x="698987" y="1591408"/>
+            <a:ext cx="1419959" cy="369332"/>
+          </a:xfrm>
+          <a:prstGeom prst="rect">
+            <a:avLst/>
+          </a:prstGeom>
+          <a:noFill/>
+        </p:spPr>
+        <p:txBody>
+          <a:bodyPr wrap="square" rtlCol="0">
+            <a:spAutoFit/>
+          </a:bodyPr>
+          <a:lstStyle/>
+          <a:p>
+            <a:r>
               <a:rPr lang="en-MY" b="1" dirty="0"/>
-              <a:t>a = 0.1</a:t>
-            </a:r>
-          </a:p>
-          <a:p>
-            <a:r>
-              <a:rPr lang="en-MY" b="1" dirty="0"/>
-              <a:t>Body Weight = 600N</a:t>
-            </a:r>
-          </a:p>
-          <a:p>
-            <a:r>
-              <a:rPr lang="en-MY" b="1" dirty="0" err="1"/>
-              <a:t>cd_threshold</a:t>
-            </a:r>
-            <a:r>
-              <a:rPr lang="en-MY" b="1" dirty="0"/>
-              <a:t> = 0.3</a:t>
-            </a:r>
-          </a:p>
-          <a:p>
-            <a:r>
-              <a:rPr lang="en-MY" b="1" dirty="0"/>
-              <a:t>Load = 250N</a:t>
-            </a:r>
-          </a:p>
-        </p:txBody>
-      </p:sp>
-      <p:pic>
-        <p:nvPicPr>
-          <p:cNvPr id="19" name="Picture 18">
-            <a:extLst>
-              <a:ext uri="{FF2B5EF4-FFF2-40B4-BE49-F238E27FC236}">
-                <a16:creationId xmlns:a16="http://schemas.microsoft.com/office/drawing/2014/main" id="{75254585-89DE-4AB0-423B-88D808BC5746}"/>
-              </a:ext>
-            </a:extLst>
-          </p:cNvPr>
-          <p:cNvPicPr>
-            <a:picLocks noChangeAspect="1"/>
-          </p:cNvPicPr>
-          <p:nvPr/>
-        </p:nvPicPr>
-        <p:blipFill rotWithShape="1">
-          <a:blip r:embed="rId2"/>
-          <a:srcRect l="54609" t="6374"/>
-          <a:stretch/>
-        </p:blipFill>
-        <p:spPr>
-          <a:xfrm>
-            <a:off x="698987" y="2655473"/>
-            <a:ext cx="4868134" cy="3476082"/>
-          </a:xfrm>
-          <a:prstGeom prst="rect">
-            <a:avLst/>
-          </a:prstGeom>
-        </p:spPr>
-      </p:pic>
-      <p:pic>
-        <p:nvPicPr>
-          <p:cNvPr id="32" name="Picture 31">
-            <a:extLst>
-              <a:ext uri="{FF2B5EF4-FFF2-40B4-BE49-F238E27FC236}">
-                <a16:creationId xmlns:a16="http://schemas.microsoft.com/office/drawing/2014/main" id="{A81E0821-7F2B-73AC-1BC0-BC82EED915F4}"/>
-              </a:ext>
-            </a:extLst>
-          </p:cNvPr>
-          <p:cNvPicPr>
-            <a:picLocks noChangeAspect="1"/>
-          </p:cNvPicPr>
-          <p:nvPr/>
-        </p:nvPicPr>
-        <p:blipFill rotWithShape="1">
-          <a:blip r:embed="rId3"/>
-          <a:srcRect l="54641" t="6395"/>
-          <a:stretch/>
-        </p:blipFill>
-        <p:spPr>
-          <a:xfrm>
-            <a:off x="6716321" y="2655473"/>
-            <a:ext cx="4876067" cy="3473671"/>
-          </a:xfrm>
-          <a:prstGeom prst="rect">
-            <a:avLst/>
-          </a:prstGeom>
-        </p:spPr>
-      </p:pic>
+              <a:t>Shoulder</a:t>
+            </a:r>
+            <a:endParaRPr lang="en-US" b="1" dirty="0"/>
+          </a:p>
+        </p:txBody>
+      </p:sp>
+      <p:sp>
+        <p:nvSpPr>
+          <p:cNvPr id="20" name="Rectangle 19">
+            <a:extLst>
+              <a:ext uri="{FF2B5EF4-FFF2-40B4-BE49-F238E27FC236}">
+                <a16:creationId xmlns:a16="http://schemas.microsoft.com/office/drawing/2014/main" id="{D40BFFDA-881C-9146-CB85-3C392E2C984E}"/>
+              </a:ext>
+            </a:extLst>
+          </p:cNvPr>
+          <p:cNvSpPr/>
+          <p:nvPr/>
+        </p:nvSpPr>
+        <p:spPr>
+          <a:xfrm>
+            <a:off x="6736082" y="4051477"/>
+            <a:ext cx="1651739" cy="569278"/>
+          </a:xfrm>
+          <a:prstGeom prst="rect">
+            <a:avLst/>
+          </a:prstGeom>
+          <a:solidFill>
+            <a:schemeClr val="accent2">
+              <a:lumMod val="20000"/>
+              <a:lumOff val="80000"/>
+            </a:schemeClr>
+          </a:solidFill>
+        </p:spPr>
+        <p:style>
+          <a:lnRef idx="2">
+            <a:schemeClr val="accent1">
+              <a:shade val="50000"/>
+            </a:schemeClr>
+          </a:lnRef>
+          <a:fillRef idx="1">
+            <a:schemeClr val="accent1"/>
+          </a:fillRef>
+          <a:effectRef idx="0">
+            <a:schemeClr val="accent1"/>
+          </a:effectRef>
+          <a:fontRef idx="minor">
+            <a:schemeClr val="lt1"/>
+          </a:fontRef>
+        </p:style>
+        <p:txBody>
+          <a:bodyPr rtlCol="0" anchor="ctr"/>
+          <a:lstStyle/>
+          <a:p>
+            <a:pPr algn="ctr"/>
+            <a:endParaRPr lang="en-US"/>
+          </a:p>
+        </p:txBody>
+      </p:sp>
+      <p:sp>
+        <p:nvSpPr>
+          <p:cNvPr id="21" name="TextBox 20">
+            <a:extLst>
+              <a:ext uri="{FF2B5EF4-FFF2-40B4-BE49-F238E27FC236}">
+                <a16:creationId xmlns:a16="http://schemas.microsoft.com/office/drawing/2014/main" id="{0B06819D-E111-29D8-127D-DC6EE063ECA1}"/>
+              </a:ext>
+            </a:extLst>
+          </p:cNvPr>
+          <p:cNvSpPr txBox="1"/>
+          <p:nvPr/>
+        </p:nvSpPr>
+        <p:spPr>
+          <a:xfrm>
+            <a:off x="6844352" y="4148827"/>
+            <a:ext cx="648532" cy="338554"/>
+          </a:xfrm>
+          <a:prstGeom prst="rect">
+            <a:avLst/>
+          </a:prstGeom>
+          <a:noFill/>
+        </p:spPr>
+        <p:txBody>
+          <a:bodyPr wrap="square" rtlCol="0">
+            <a:spAutoFit/>
+          </a:bodyPr>
+          <a:lstStyle/>
+          <a:p>
+            <a:r>
+              <a:rPr lang="en-US" altLang="zh-CN" sz="1600" dirty="0"/>
+              <a:t>F ’ </a:t>
+            </a:r>
+            <a:r>
+              <a:rPr lang="en-MY" sz="1600" dirty="0"/>
+              <a:t>= </a:t>
+            </a:r>
+            <a:endParaRPr lang="en-US" sz="1600" dirty="0"/>
+          </a:p>
+        </p:txBody>
+      </p:sp>
+      <p:sp>
+        <p:nvSpPr>
+          <p:cNvPr id="22" name="TextBox 21">
+            <a:extLst>
+              <a:ext uri="{FF2B5EF4-FFF2-40B4-BE49-F238E27FC236}">
+                <a16:creationId xmlns:a16="http://schemas.microsoft.com/office/drawing/2014/main" id="{EC05F178-AA3E-3C79-8733-1FDAEC933256}"/>
+              </a:ext>
+            </a:extLst>
+          </p:cNvPr>
+          <p:cNvSpPr txBox="1"/>
+          <p:nvPr/>
+        </p:nvSpPr>
+        <p:spPr>
+          <a:xfrm>
+            <a:off x="7561559" y="4148827"/>
+            <a:ext cx="744438" cy="338554"/>
+          </a:xfrm>
+          <a:prstGeom prst="rect">
+            <a:avLst/>
+          </a:prstGeom>
+          <a:noFill/>
+        </p:spPr>
+        <p:txBody>
+          <a:bodyPr wrap="square" rtlCol="0">
+            <a:spAutoFit/>
+          </a:bodyPr>
+          <a:lstStyle/>
+          <a:p>
+            <a:r>
+              <a:rPr lang="en-MY" sz="1600" dirty="0"/>
+              <a:t>M + d</a:t>
+            </a:r>
+            <a:endParaRPr lang="en-US" sz="1600" dirty="0"/>
+          </a:p>
+        </p:txBody>
+      </p:sp>
+      <p:sp>
+        <p:nvSpPr>
+          <p:cNvPr id="23" name="TextBox 22">
+            <a:extLst>
+              <a:ext uri="{FF2B5EF4-FFF2-40B4-BE49-F238E27FC236}">
+                <a16:creationId xmlns:a16="http://schemas.microsoft.com/office/drawing/2014/main" id="{797B6BB7-A6A5-7A41-BF6D-F63A31AB64DD}"/>
+              </a:ext>
+            </a:extLst>
+          </p:cNvPr>
+          <p:cNvSpPr txBox="1"/>
+          <p:nvPr/>
+        </p:nvSpPr>
+        <p:spPr>
+          <a:xfrm>
+            <a:off x="7430270" y="4147458"/>
+            <a:ext cx="278060" cy="338554"/>
+          </a:xfrm>
+          <a:prstGeom prst="rect">
+            <a:avLst/>
+          </a:prstGeom>
+          <a:noFill/>
+        </p:spPr>
+        <p:txBody>
+          <a:bodyPr wrap="square" rtlCol="0">
+            <a:spAutoFit/>
+          </a:bodyPr>
+          <a:lstStyle/>
+          <a:p>
+            <a:r>
+              <a:rPr lang="en-MY" sz="1600" dirty="0"/>
+              <a:t>c</a:t>
+            </a:r>
+            <a:endParaRPr lang="en-US" sz="1600" dirty="0"/>
+          </a:p>
+        </p:txBody>
+      </p:sp>
+      <p:sp>
+        <p:nvSpPr>
+          <p:cNvPr id="27" name="Rectangle 26">
+            <a:extLst>
+              <a:ext uri="{FF2B5EF4-FFF2-40B4-BE49-F238E27FC236}">
+                <a16:creationId xmlns:a16="http://schemas.microsoft.com/office/drawing/2014/main" id="{B537379F-B44A-1810-6C3B-B899B3676D83}"/>
+              </a:ext>
+            </a:extLst>
+          </p:cNvPr>
+          <p:cNvSpPr/>
+          <p:nvPr/>
+        </p:nvSpPr>
+        <p:spPr>
+          <a:xfrm>
+            <a:off x="6201681" y="2788534"/>
+            <a:ext cx="2842721" cy="738554"/>
+          </a:xfrm>
+          <a:prstGeom prst="rect">
+            <a:avLst/>
+          </a:prstGeom>
+          <a:solidFill>
+            <a:schemeClr val="accent2">
+              <a:lumMod val="20000"/>
+              <a:lumOff val="80000"/>
+            </a:schemeClr>
+          </a:solidFill>
+        </p:spPr>
+        <p:style>
+          <a:lnRef idx="2">
+            <a:schemeClr val="accent1">
+              <a:shade val="50000"/>
+            </a:schemeClr>
+          </a:lnRef>
+          <a:fillRef idx="1">
+            <a:schemeClr val="accent1"/>
+          </a:fillRef>
+          <a:effectRef idx="0">
+            <a:schemeClr val="accent1"/>
+          </a:effectRef>
+          <a:fontRef idx="minor">
+            <a:schemeClr val="lt1"/>
+          </a:fontRef>
+        </p:style>
+        <p:txBody>
+          <a:bodyPr rtlCol="0" anchor="ctr"/>
+          <a:lstStyle/>
+          <a:p>
+            <a:pPr algn="ctr"/>
+            <a:endParaRPr lang="en-US"/>
+          </a:p>
+        </p:txBody>
+      </p:sp>
+      <p:sp>
+        <p:nvSpPr>
+          <p:cNvPr id="28" name="TextBox 27">
+            <a:extLst>
+              <a:ext uri="{FF2B5EF4-FFF2-40B4-BE49-F238E27FC236}">
+                <a16:creationId xmlns:a16="http://schemas.microsoft.com/office/drawing/2014/main" id="{533FEF6E-C72C-EAB6-6B01-9AFEBDF1D5D8}"/>
+              </a:ext>
+            </a:extLst>
+          </p:cNvPr>
+          <p:cNvSpPr txBox="1"/>
+          <p:nvPr/>
+        </p:nvSpPr>
+        <p:spPr>
+          <a:xfrm>
+            <a:off x="6323308" y="2957004"/>
+            <a:ext cx="1660451" cy="338554"/>
+          </a:xfrm>
+          <a:prstGeom prst="rect">
+            <a:avLst/>
+          </a:prstGeom>
+          <a:noFill/>
+        </p:spPr>
+        <p:txBody>
+          <a:bodyPr wrap="square" rtlCol="0">
+            <a:spAutoFit/>
+          </a:bodyPr>
+          <a:lstStyle/>
+          <a:p>
+            <a:r>
+              <a:rPr lang="en-US" altLang="zh-CN" sz="1600" dirty="0" err="1"/>
+              <a:t>σ_bending</a:t>
+            </a:r>
+            <a:r>
+              <a:rPr lang="en-MY" sz="1600" dirty="0"/>
+              <a:t> * A= </a:t>
+            </a:r>
+            <a:endParaRPr lang="en-US" sz="1600" dirty="0"/>
+          </a:p>
+        </p:txBody>
+      </p:sp>
+      <p:sp>
+        <p:nvSpPr>
+          <p:cNvPr id="29" name="TextBox 28">
+            <a:extLst>
+              <a:ext uri="{FF2B5EF4-FFF2-40B4-BE49-F238E27FC236}">
+                <a16:creationId xmlns:a16="http://schemas.microsoft.com/office/drawing/2014/main" id="{0589F147-CE4A-2532-B52F-6F4C0E345A5B}"/>
+              </a:ext>
+            </a:extLst>
+          </p:cNvPr>
+          <p:cNvSpPr txBox="1"/>
+          <p:nvPr/>
+        </p:nvSpPr>
+        <p:spPr>
+          <a:xfrm>
+            <a:off x="7977680" y="2824362"/>
+            <a:ext cx="812723" cy="338554"/>
+          </a:xfrm>
+          <a:prstGeom prst="rect">
+            <a:avLst/>
+          </a:prstGeom>
+          <a:noFill/>
+        </p:spPr>
+        <p:txBody>
+          <a:bodyPr wrap="square" rtlCol="0">
+            <a:spAutoFit/>
+          </a:bodyPr>
+          <a:lstStyle/>
+          <a:p>
+            <a:r>
+              <a:rPr lang="en-MY" sz="1600" dirty="0"/>
+              <a:t>M</a:t>
+            </a:r>
+            <a:r>
+              <a:rPr lang="en-US" altLang="zh-CN" sz="1600" dirty="0"/>
+              <a:t>y * A</a:t>
+            </a:r>
+            <a:endParaRPr lang="en-US" sz="1600" dirty="0"/>
+          </a:p>
+        </p:txBody>
+      </p:sp>
+      <p:sp>
+        <p:nvSpPr>
+          <p:cNvPr id="30" name="TextBox 29">
+            <a:extLst>
+              <a:ext uri="{FF2B5EF4-FFF2-40B4-BE49-F238E27FC236}">
+                <a16:creationId xmlns:a16="http://schemas.microsoft.com/office/drawing/2014/main" id="{6187C751-6A23-E6A7-6BB9-6C3807AF6B0C}"/>
+              </a:ext>
+            </a:extLst>
+          </p:cNvPr>
+          <p:cNvSpPr txBox="1"/>
+          <p:nvPr/>
+        </p:nvSpPr>
+        <p:spPr>
+          <a:xfrm>
+            <a:off x="8302801" y="3087010"/>
+            <a:ext cx="278060" cy="338554"/>
+          </a:xfrm>
+          <a:prstGeom prst="rect">
+            <a:avLst/>
+          </a:prstGeom>
+          <a:noFill/>
+        </p:spPr>
+        <p:txBody>
+          <a:bodyPr wrap="square" rtlCol="0">
+            <a:spAutoFit/>
+          </a:bodyPr>
+          <a:lstStyle/>
+          <a:p>
+            <a:r>
+              <a:rPr lang="en-US" altLang="zh-CN" sz="1600" dirty="0"/>
+              <a:t>I</a:t>
+            </a:r>
+            <a:endParaRPr lang="en-US" sz="1600" dirty="0"/>
+          </a:p>
+        </p:txBody>
+      </p:sp>
+      <p:cxnSp>
+        <p:nvCxnSpPr>
+          <p:cNvPr id="31" name="Straight Connector 30">
+            <a:extLst>
+              <a:ext uri="{FF2B5EF4-FFF2-40B4-BE49-F238E27FC236}">
+                <a16:creationId xmlns:a16="http://schemas.microsoft.com/office/drawing/2014/main" id="{03729C2F-2266-F533-2218-341E9150524F}"/>
+              </a:ext>
+            </a:extLst>
+          </p:cNvPr>
+          <p:cNvCxnSpPr>
+            <a:cxnSpLocks/>
+            <a:stCxn id="28" idx="3"/>
+          </p:cNvCxnSpPr>
+          <p:nvPr/>
+        </p:nvCxnSpPr>
+        <p:spPr>
+          <a:xfrm>
+            <a:off x="7983759" y="3126281"/>
+            <a:ext cx="806644" cy="0"/>
+          </a:xfrm>
+          <a:prstGeom prst="line">
+            <a:avLst/>
+          </a:prstGeom>
+          <a:ln w="12700">
+            <a:solidFill>
+              <a:schemeClr val="tx1"/>
+            </a:solidFill>
+          </a:ln>
+        </p:spPr>
+        <p:style>
+          <a:lnRef idx="1">
+            <a:schemeClr val="accent1"/>
+          </a:lnRef>
+          <a:fillRef idx="0">
+            <a:schemeClr val="accent1"/>
+          </a:fillRef>
+          <a:effectRef idx="0">
+            <a:schemeClr val="accent1"/>
+          </a:effectRef>
+          <a:fontRef idx="minor">
+            <a:schemeClr val="tx1"/>
+          </a:fontRef>
+        </p:style>
+      </p:cxnSp>
+      <p:cxnSp>
+        <p:nvCxnSpPr>
+          <p:cNvPr id="40" name="Straight Arrow Connector 39">
+            <a:extLst>
+              <a:ext uri="{FF2B5EF4-FFF2-40B4-BE49-F238E27FC236}">
+                <a16:creationId xmlns:a16="http://schemas.microsoft.com/office/drawing/2014/main" id="{F9907598-58E2-A28C-03F6-0F516DA17AA9}"/>
+              </a:ext>
+            </a:extLst>
+          </p:cNvPr>
+          <p:cNvCxnSpPr>
+            <a:cxnSpLocks/>
+            <a:stCxn id="13" idx="2"/>
+          </p:cNvCxnSpPr>
+          <p:nvPr/>
+        </p:nvCxnSpPr>
+        <p:spPr>
+          <a:xfrm>
+            <a:off x="7579461" y="2250661"/>
+            <a:ext cx="0" cy="474813"/>
+          </a:xfrm>
+          <a:prstGeom prst="straightConnector1">
+            <a:avLst/>
+          </a:prstGeom>
+          <a:ln>
+            <a:solidFill>
+              <a:schemeClr val="tx1"/>
+            </a:solidFill>
+            <a:tailEnd type="triangle"/>
+          </a:ln>
+        </p:spPr>
+        <p:style>
+          <a:lnRef idx="1">
+            <a:schemeClr val="accent1"/>
+          </a:lnRef>
+          <a:fillRef idx="0">
+            <a:schemeClr val="accent1"/>
+          </a:fillRef>
+          <a:effectRef idx="0">
+            <a:schemeClr val="accent1"/>
+          </a:effectRef>
+          <a:fontRef idx="minor">
+            <a:schemeClr val="tx1"/>
+          </a:fontRef>
+        </p:style>
+      </p:cxnSp>
+      <p:cxnSp>
+        <p:nvCxnSpPr>
+          <p:cNvPr id="44" name="Straight Arrow Connector 43">
+            <a:extLst>
+              <a:ext uri="{FF2B5EF4-FFF2-40B4-BE49-F238E27FC236}">
+                <a16:creationId xmlns:a16="http://schemas.microsoft.com/office/drawing/2014/main" id="{263ED32C-0D1C-3642-E556-8205C9613785}"/>
+              </a:ext>
+            </a:extLst>
+          </p:cNvPr>
+          <p:cNvCxnSpPr>
+            <a:cxnSpLocks/>
+          </p:cNvCxnSpPr>
+          <p:nvPr/>
+        </p:nvCxnSpPr>
+        <p:spPr>
+          <a:xfrm>
+            <a:off x="7579461" y="3527088"/>
+            <a:ext cx="0" cy="474813"/>
+          </a:xfrm>
+          <a:prstGeom prst="straightConnector1">
+            <a:avLst/>
+          </a:prstGeom>
+          <a:ln>
+            <a:solidFill>
+              <a:schemeClr val="tx1"/>
+            </a:solidFill>
+            <a:tailEnd type="triangle"/>
+          </a:ln>
+        </p:spPr>
+        <p:style>
+          <a:lnRef idx="1">
+            <a:schemeClr val="accent1"/>
+          </a:lnRef>
+          <a:fillRef idx="0">
+            <a:schemeClr val="accent1"/>
+          </a:fillRef>
+          <a:effectRef idx="0">
+            <a:schemeClr val="accent1"/>
+          </a:effectRef>
+          <a:fontRef idx="minor">
+            <a:schemeClr val="tx1"/>
+          </a:fontRef>
+        </p:style>
+      </p:cxnSp>
+      <p:cxnSp>
+        <p:nvCxnSpPr>
+          <p:cNvPr id="47" name="Straight Arrow Connector 46">
+            <a:extLst>
+              <a:ext uri="{FF2B5EF4-FFF2-40B4-BE49-F238E27FC236}">
+                <a16:creationId xmlns:a16="http://schemas.microsoft.com/office/drawing/2014/main" id="{153E4199-0BF9-FC0D-D506-7EE9E8F54685}"/>
+              </a:ext>
+            </a:extLst>
+          </p:cNvPr>
+          <p:cNvCxnSpPr>
+            <a:cxnSpLocks/>
+          </p:cNvCxnSpPr>
+          <p:nvPr/>
+        </p:nvCxnSpPr>
+        <p:spPr>
+          <a:xfrm>
+            <a:off x="7528661" y="4790031"/>
+            <a:ext cx="0" cy="474813"/>
+          </a:xfrm>
+          <a:prstGeom prst="straightConnector1">
+            <a:avLst/>
+          </a:prstGeom>
+          <a:ln>
+            <a:solidFill>
+              <a:schemeClr val="tx1"/>
+            </a:solidFill>
+            <a:tailEnd type="triangle"/>
+          </a:ln>
+        </p:spPr>
+        <p:style>
+          <a:lnRef idx="1">
+            <a:schemeClr val="accent1"/>
+          </a:lnRef>
+          <a:fillRef idx="0">
+            <a:schemeClr val="accent1"/>
+          </a:fillRef>
+          <a:effectRef idx="0">
+            <a:schemeClr val="accent1"/>
+          </a:effectRef>
+          <a:fontRef idx="minor">
+            <a:schemeClr val="tx1"/>
+          </a:fontRef>
+        </p:style>
+      </p:cxnSp>
     </p:spTree>
     <p:extLst>
       <p:ext uri="{BB962C8B-B14F-4D97-AF65-F5344CB8AC3E}">
-        <p14:creationId xmlns:p14="http://schemas.microsoft.com/office/powerpoint/2010/main" val="2168008696"/>
+        <p14:creationId xmlns:p14="http://schemas.microsoft.com/office/powerpoint/2010/main" val="4009868059"/>
       </p:ext>
     </p:extLst>
   </p:cSld>
@@ -5993,7 +7170,18 @@
           <a:p>
             <a:r>
               <a:rPr lang="en-MY" sz="2800" dirty="0"/>
-              <a:t>Difficulties for Shoulder Risk</a:t>
+              <a:t>How to Obtain Ultimate Strength Percentage, S </a:t>
+            </a:r>
+            <a:br>
+              <a:rPr lang="en-MY" sz="2800" dirty="0"/>
+            </a:br>
+            <a:r>
+              <a:rPr lang="en-MY" sz="2800" i="0" dirty="0"/>
+              <a:t>(Reviewed Version)</a:t>
+            </a:r>
+            <a:r>
+              <a:rPr lang="en-MY" sz="2800" dirty="0"/>
+              <a:t> </a:t>
             </a:r>
             <a:endParaRPr lang="en-US" sz="2800" dirty="0"/>
           </a:p>
@@ -6047,8 +7235,8 @@
         </p:nvSpPr>
         <p:spPr>
           <a:xfrm>
-            <a:off x="698987" y="1392622"/>
-            <a:ext cx="10883413" cy="5078313"/>
+            <a:off x="936282" y="1540608"/>
+            <a:ext cx="4472453" cy="369332"/>
           </a:xfrm>
           <a:prstGeom prst="rect">
             <a:avLst/>
@@ -6061,120 +7249,20 @@
           </a:bodyPr>
           <a:lstStyle/>
           <a:p>
-            <a:pPr marL="342900" indent="-342900">
-              <a:buFont typeface="+mj-lt"/>
-              <a:buAutoNum type="arabicPeriod"/>
-            </a:pPr>
             <a:r>
               <a:rPr lang="en-MY" b="1" dirty="0"/>
-              <a:t>More forces need to be consider (tensile force, compressive force, shear force), each force has different direction. </a:t>
-            </a:r>
-          </a:p>
-          <a:p>
-            <a:pPr marL="342900" indent="-342900">
-              <a:buFont typeface="+mj-lt"/>
-              <a:buAutoNum type="arabicPeriod"/>
-            </a:pPr>
-            <a:endParaRPr lang="en-MY" b="1" dirty="0"/>
-          </a:p>
-          <a:p>
-            <a:pPr marL="342900" indent="-342900">
-              <a:buFont typeface="+mj-lt"/>
-              <a:buAutoNum type="arabicPeriod"/>
-            </a:pPr>
-            <a:r>
-              <a:rPr lang="en-MY" b="1" dirty="0"/>
-              <a:t>The current research doesn’t have a golden standard for the maximum acceptable force for all the 3 directions. Current way to deal with shoulder risk is as shown in the figure below, we need to somehow apply a qualitative way (select a category) for the first step </a:t>
-            </a:r>
-          </a:p>
-          <a:p>
-            <a:pPr marL="342900" indent="-342900">
-              <a:buFont typeface="+mj-lt"/>
-              <a:buAutoNum type="arabicPeriod"/>
-            </a:pPr>
-            <a:endParaRPr lang="en-MY" b="1" dirty="0"/>
-          </a:p>
-          <a:p>
-            <a:pPr marL="342900" indent="-342900">
-              <a:buFont typeface="+mj-lt"/>
-              <a:buAutoNum type="arabicPeriod"/>
-            </a:pPr>
-            <a:endParaRPr lang="en-MY" b="1" dirty="0"/>
-          </a:p>
-          <a:p>
-            <a:pPr marL="342900" indent="-342900">
-              <a:buFont typeface="+mj-lt"/>
-              <a:buAutoNum type="arabicPeriod"/>
-            </a:pPr>
-            <a:endParaRPr lang="en-MY" b="1" dirty="0"/>
-          </a:p>
-          <a:p>
-            <a:pPr marL="342900" indent="-342900">
-              <a:buFont typeface="+mj-lt"/>
-              <a:buAutoNum type="arabicPeriod"/>
-            </a:pPr>
-            <a:endParaRPr lang="en-MY" b="1" dirty="0"/>
-          </a:p>
-          <a:p>
-            <a:pPr marL="342900" indent="-342900">
-              <a:buFont typeface="+mj-lt"/>
-              <a:buAutoNum type="arabicPeriod"/>
-            </a:pPr>
-            <a:endParaRPr lang="en-MY" b="1" dirty="0"/>
-          </a:p>
-          <a:p>
-            <a:pPr marL="342900" indent="-342900">
-              <a:buFont typeface="+mj-lt"/>
-              <a:buAutoNum type="arabicPeriod"/>
-            </a:pPr>
-            <a:endParaRPr lang="en-MY" b="1" dirty="0"/>
-          </a:p>
-          <a:p>
-            <a:pPr marL="342900" indent="-342900">
-              <a:buFont typeface="+mj-lt"/>
-              <a:buAutoNum type="arabicPeriod"/>
-            </a:pPr>
-            <a:endParaRPr lang="en-MY" b="1" dirty="0"/>
-          </a:p>
-          <a:p>
-            <a:pPr marL="342900" indent="-342900">
-              <a:buFont typeface="+mj-lt"/>
-              <a:buAutoNum type="arabicPeriod"/>
-            </a:pPr>
-            <a:endParaRPr lang="en-MY" b="1" dirty="0"/>
-          </a:p>
-          <a:p>
-            <a:pPr marL="342900" indent="-342900">
-              <a:buFont typeface="+mj-lt"/>
-              <a:buAutoNum type="arabicPeriod"/>
-            </a:pPr>
-            <a:endParaRPr lang="en-MY" b="1" dirty="0"/>
-          </a:p>
-          <a:p>
-            <a:pPr marL="342900" indent="-342900">
-              <a:buFont typeface="+mj-lt"/>
-              <a:buAutoNum type="arabicPeriod"/>
-            </a:pPr>
-            <a:endParaRPr lang="en-MY" b="1" dirty="0"/>
-          </a:p>
-          <a:p>
-            <a:pPr marL="342900" indent="-342900">
-              <a:buFont typeface="+mj-lt"/>
-              <a:buAutoNum type="arabicPeriod"/>
-            </a:pPr>
-            <a:r>
-              <a:rPr lang="en-MY" b="1" dirty="0"/>
-              <a:t>Due to the time limitation and the complexity, I suggest we can just focus on the low back risk at this stage.</a:t>
-            </a:r>
+              <a:t>Occupational Biomechanics pg. 392</a:t>
+            </a:r>
+            <a:endParaRPr lang="en-US" b="1" dirty="0"/>
           </a:p>
         </p:txBody>
       </p:sp>
       <p:pic>
         <p:nvPicPr>
-          <p:cNvPr id="3" name="Picture 2">
-            <a:extLst>
-              <a:ext uri="{FF2B5EF4-FFF2-40B4-BE49-F238E27FC236}">
-                <a16:creationId xmlns:a16="http://schemas.microsoft.com/office/drawing/2014/main" id="{252B47E7-5559-ECBB-E11A-8652EFA7B9AC}"/>
+          <p:cNvPr id="11" name="Picture 10">
+            <a:extLst>
+              <a:ext uri="{FF2B5EF4-FFF2-40B4-BE49-F238E27FC236}">
+                <a16:creationId xmlns:a16="http://schemas.microsoft.com/office/drawing/2014/main" id="{AD161795-381C-143E-2AA2-8293C57BA4C4}"/>
               </a:ext>
             </a:extLst>
           </p:cNvPr>
@@ -6191,18 +7279,61 @@
         </p:blipFill>
         <p:spPr>
           <a:xfrm>
-            <a:off x="1094302" y="3196014"/>
-            <a:ext cx="5154098" cy="2238884"/>
+            <a:off x="1036321" y="2002674"/>
+            <a:ext cx="7172960" cy="3454372"/>
           </a:xfrm>
           <a:prstGeom prst="rect">
             <a:avLst/>
           </a:prstGeom>
         </p:spPr>
       </p:pic>
+      <p:sp>
+        <p:nvSpPr>
+          <p:cNvPr id="18" name="TextBox 17">
+            <a:extLst>
+              <a:ext uri="{FF2B5EF4-FFF2-40B4-BE49-F238E27FC236}">
+                <a16:creationId xmlns:a16="http://schemas.microsoft.com/office/drawing/2014/main" id="{9A2FD9BB-AC57-FACB-0A48-A7C329097F56}"/>
+              </a:ext>
+            </a:extLst>
+          </p:cNvPr>
+          <p:cNvSpPr txBox="1"/>
+          <p:nvPr/>
+        </p:nvSpPr>
+        <p:spPr>
+          <a:xfrm>
+            <a:off x="1219200" y="5730240"/>
+            <a:ext cx="9906000" cy="646331"/>
+          </a:xfrm>
+          <a:prstGeom prst="rect">
+            <a:avLst/>
+          </a:prstGeom>
+          <a:noFill/>
+        </p:spPr>
+        <p:txBody>
+          <a:bodyPr wrap="square" rtlCol="0">
+            <a:spAutoFit/>
+          </a:bodyPr>
+          <a:lstStyle/>
+          <a:p>
+            <a:r>
+              <a:rPr lang="en-MY" dirty="0"/>
+              <a:t>*** But human shoulders can carry the load with the weight above 115N load, thus it doesn’t</a:t>
+            </a:r>
+            <a:br>
+              <a:rPr lang="en-MY" dirty="0"/>
+            </a:br>
+            <a:r>
+              <a:rPr lang="en-MY" dirty="0"/>
+              <a:t>       make sense</a:t>
+            </a:r>
+            <a:endParaRPr lang="en-US" dirty="0"/>
+          </a:p>
+        </p:txBody>
+      </p:sp>
     </p:spTree>
     <p:extLst>
       <p:ext uri="{BB962C8B-B14F-4D97-AF65-F5344CB8AC3E}">
-        <p14:creationId xmlns:p14="http://schemas.microsoft.com/office/powerpoint/2010/main" val="1112897419"/>
+        <p14:creationId xmlns:p14="http://schemas.microsoft.com/office/powerpoint/2010/main" val="1358296653"/>
       </p:ext>
     </p:extLst>
   </p:cSld>
@@ -6245,25 +7376,43 @@
             <p:ph type="title"/>
           </p:nvPr>
         </p:nvSpPr>
-        <p:spPr/>
-        <p:txBody>
-          <a:bodyPr/>
-          <a:lstStyle/>
-          <a:p>
-            <a:r>
-              <a:rPr lang="en-MY"/>
-              <a:t>Challenges of This Week</a:t>
-            </a:r>
-            <a:endParaRPr lang="en-US"/>
-          </a:p>
-        </p:txBody>
-      </p:sp>
-      <p:sp>
-        <p:nvSpPr>
-          <p:cNvPr id="3" name="Slide Number Placeholder 2">
-            <a:extLst>
-              <a:ext uri="{FF2B5EF4-FFF2-40B4-BE49-F238E27FC236}">
-                <a16:creationId xmlns:a16="http://schemas.microsoft.com/office/drawing/2014/main" id="{3301FDD1-104B-C9B8-98AD-09C0483E990B}"/>
+        <p:spPr>
+          <a:xfrm>
+            <a:off x="530470" y="484332"/>
+            <a:ext cx="9756530" cy="875546"/>
+          </a:xfrm>
+        </p:spPr>
+        <p:txBody>
+          <a:bodyPr>
+            <a:normAutofit/>
+          </a:bodyPr>
+          <a:lstStyle/>
+          <a:p>
+            <a:r>
+              <a:rPr lang="en-MY" sz="2800" dirty="0"/>
+              <a:t>How to Obtain Ultimate Strength Percentage, S </a:t>
+            </a:r>
+            <a:br>
+              <a:rPr lang="en-MY" sz="2800" dirty="0"/>
+            </a:br>
+            <a:r>
+              <a:rPr lang="en-MY" sz="2800" i="0" dirty="0"/>
+              <a:t>(Reviewed Version)</a:t>
+            </a:r>
+            <a:r>
+              <a:rPr lang="en-MY" sz="2800" dirty="0"/>
+              <a:t> </a:t>
+            </a:r>
+            <a:endParaRPr lang="en-US" sz="2800" dirty="0"/>
+          </a:p>
+        </p:txBody>
+      </p:sp>
+      <p:sp>
+        <p:nvSpPr>
+          <p:cNvPr id="4" name="Slide Number Placeholder 3">
+            <a:extLst>
+              <a:ext uri="{FF2B5EF4-FFF2-40B4-BE49-F238E27FC236}">
+                <a16:creationId xmlns:a16="http://schemas.microsoft.com/office/drawing/2014/main" id="{CE53EFF4-FAB5-738D-DCCA-789DE804A66E}"/>
               </a:ext>
             </a:extLst>
           </p:cNvPr>
@@ -6274,7 +7423,12 @@
             <p:ph type="sldNum" sz="quarter" idx="12"/>
           </p:nvPr>
         </p:nvSpPr>
-        <p:spPr/>
+        <p:spPr>
+          <a:xfrm>
+            <a:off x="10287000" y="6035040"/>
+            <a:ext cx="838200" cy="365760"/>
+          </a:xfrm>
+        </p:spPr>
         <p:txBody>
           <a:bodyPr/>
           <a:lstStyle/>
@@ -6289,10 +7443,10 @@
       </p:sp>
       <p:sp>
         <p:nvSpPr>
-          <p:cNvPr id="4" name="TextBox 3">
-            <a:extLst>
-              <a:ext uri="{FF2B5EF4-FFF2-40B4-BE49-F238E27FC236}">
-                <a16:creationId xmlns:a16="http://schemas.microsoft.com/office/drawing/2014/main" id="{7B46C7D6-9AA3-F564-4F35-B86153603C2F}"/>
+          <p:cNvPr id="153" name="TextBox 152">
+            <a:extLst>
+              <a:ext uri="{FF2B5EF4-FFF2-40B4-BE49-F238E27FC236}">
+                <a16:creationId xmlns:a16="http://schemas.microsoft.com/office/drawing/2014/main" id="{2806D040-4630-3135-9B3F-0064C65A4C2A}"/>
               </a:ext>
             </a:extLst>
           </p:cNvPr>
@@ -6301,8 +7455,8 @@
         </p:nvSpPr>
         <p:spPr>
           <a:xfrm>
-            <a:off x="1271443" y="1769915"/>
-            <a:ext cx="10392510" cy="465640"/>
+            <a:off x="698987" y="1423102"/>
+            <a:ext cx="2694453" cy="1200329"/>
           </a:xfrm>
           <a:prstGeom prst="rect">
             <a:avLst/>
@@ -6315,29 +7469,259 @@
           </a:bodyPr>
           <a:lstStyle/>
           <a:p>
-            <a:pPr marL="342900" indent="-342900">
-              <a:lnSpc>
-                <a:spcPct val="150000"/>
-              </a:lnSpc>
-              <a:buAutoNum type="arabicPeriod"/>
-            </a:pPr>
-            <a:r>
-              <a:rPr lang="en-US" dirty="0"/>
-              <a:t>Couldn’t find useful information for shoulder</a:t>
-            </a:r>
-          </a:p>
-        </p:txBody>
-      </p:sp>
+            <a:r>
+              <a:rPr lang="en-MY" b="1" dirty="0"/>
+              <a:t>a = 10</a:t>
+            </a:r>
+          </a:p>
+          <a:p>
+            <a:r>
+              <a:rPr lang="en-MY" b="1" dirty="0"/>
+              <a:t>Body weight = 600N</a:t>
+            </a:r>
+          </a:p>
+          <a:p>
+            <a:r>
+              <a:rPr lang="en-MY" b="1" dirty="0"/>
+              <a:t>Repetition = 30</a:t>
+            </a:r>
+          </a:p>
+          <a:p>
+            <a:r>
+              <a:rPr lang="en-MY" b="1" dirty="0"/>
+              <a:t>Load = 166N</a:t>
+            </a:r>
+          </a:p>
+        </p:txBody>
+      </p:sp>
+      <p:sp>
+        <p:nvSpPr>
+          <p:cNvPr id="11" name="TextBox 10">
+            <a:extLst>
+              <a:ext uri="{FF2B5EF4-FFF2-40B4-BE49-F238E27FC236}">
+                <a16:creationId xmlns:a16="http://schemas.microsoft.com/office/drawing/2014/main" id="{E93124ED-6702-EEB6-2185-00A5B0337F8F}"/>
+              </a:ext>
+            </a:extLst>
+          </p:cNvPr>
+          <p:cNvSpPr txBox="1"/>
+          <p:nvPr/>
+        </p:nvSpPr>
+        <p:spPr>
+          <a:xfrm>
+            <a:off x="6716321" y="1423102"/>
+            <a:ext cx="2694453" cy="1200329"/>
+          </a:xfrm>
+          <a:prstGeom prst="rect">
+            <a:avLst/>
+          </a:prstGeom>
+          <a:noFill/>
+        </p:spPr>
+        <p:txBody>
+          <a:bodyPr wrap="square" rtlCol="0">
+            <a:spAutoFit/>
+          </a:bodyPr>
+          <a:lstStyle/>
+          <a:p>
+            <a:r>
+              <a:rPr lang="en-MY" b="1" dirty="0"/>
+              <a:t>a = 10</a:t>
+            </a:r>
+          </a:p>
+          <a:p>
+            <a:r>
+              <a:rPr lang="en-MY" b="1" dirty="0"/>
+              <a:t>Body Weight = 600N</a:t>
+            </a:r>
+          </a:p>
+          <a:p>
+            <a:r>
+              <a:rPr lang="en-MY" b="1" dirty="0"/>
+              <a:t>Repetition 30</a:t>
+            </a:r>
+          </a:p>
+          <a:p>
+            <a:r>
+              <a:rPr lang="en-MY" b="1" dirty="0"/>
+              <a:t>Load = 230N</a:t>
+            </a:r>
+          </a:p>
+        </p:txBody>
+      </p:sp>
+      <p:pic>
+        <p:nvPicPr>
+          <p:cNvPr id="3" name="Picture 2">
+            <a:extLst>
+              <a:ext uri="{FF2B5EF4-FFF2-40B4-BE49-F238E27FC236}">
+                <a16:creationId xmlns:a16="http://schemas.microsoft.com/office/drawing/2014/main" id="{446809DF-76FA-9ED7-94DC-BAAE5C1952CB}"/>
+              </a:ext>
+            </a:extLst>
+          </p:cNvPr>
+          <p:cNvPicPr>
+            <a:picLocks noChangeAspect="1"/>
+          </p:cNvPicPr>
+          <p:nvPr/>
+        </p:nvPicPr>
+        <p:blipFill>
+          <a:blip r:embed="rId2"/>
+          <a:stretch>
+            <a:fillRect/>
+          </a:stretch>
+        </p:blipFill>
+        <p:spPr>
+          <a:xfrm>
+            <a:off x="661990" y="2658978"/>
+            <a:ext cx="4793930" cy="3466660"/>
+          </a:xfrm>
+          <a:prstGeom prst="rect">
+            <a:avLst/>
+          </a:prstGeom>
+        </p:spPr>
+      </p:pic>
+      <p:pic>
+        <p:nvPicPr>
+          <p:cNvPr id="5" name="Picture 4">
+            <a:extLst>
+              <a:ext uri="{FF2B5EF4-FFF2-40B4-BE49-F238E27FC236}">
+                <a16:creationId xmlns:a16="http://schemas.microsoft.com/office/drawing/2014/main" id="{C5F06537-3C18-E16B-A4C8-5986629D7E9F}"/>
+              </a:ext>
+            </a:extLst>
+          </p:cNvPr>
+          <p:cNvPicPr>
+            <a:picLocks noChangeAspect="1"/>
+          </p:cNvPicPr>
+          <p:nvPr/>
+        </p:nvPicPr>
+        <p:blipFill>
+          <a:blip r:embed="rId3"/>
+          <a:stretch>
+            <a:fillRect/>
+          </a:stretch>
+        </p:blipFill>
+        <p:spPr>
+          <a:xfrm>
+            <a:off x="6715759" y="2629618"/>
+            <a:ext cx="4879603" cy="3496019"/>
+          </a:xfrm>
+          <a:prstGeom prst="rect">
+            <a:avLst/>
+          </a:prstGeom>
+        </p:spPr>
+      </p:pic>
+      <p:pic>
+        <p:nvPicPr>
+          <p:cNvPr id="6" name="Picture 5">
+            <a:extLst>
+              <a:ext uri="{FF2B5EF4-FFF2-40B4-BE49-F238E27FC236}">
+                <a16:creationId xmlns:a16="http://schemas.microsoft.com/office/drawing/2014/main" id="{D31358A6-C290-EF5D-ED82-DB23615B91AA}"/>
+              </a:ext>
+            </a:extLst>
+          </p:cNvPr>
+          <p:cNvPicPr>
+            <a:picLocks noChangeAspect="1"/>
+          </p:cNvPicPr>
+          <p:nvPr/>
+        </p:nvPicPr>
+        <p:blipFill>
+          <a:blip r:embed="rId4"/>
+          <a:stretch>
+            <a:fillRect/>
+          </a:stretch>
+        </p:blipFill>
+        <p:spPr>
+          <a:xfrm>
+            <a:off x="3185517" y="3539844"/>
+            <a:ext cx="3738165" cy="2847854"/>
+          </a:xfrm>
+          <a:prstGeom prst="rect">
+            <a:avLst/>
+          </a:prstGeom>
+        </p:spPr>
+      </p:pic>
     </p:spTree>
     <p:extLst>
       <p:ext uri="{BB962C8B-B14F-4D97-AF65-F5344CB8AC3E}">
-        <p14:creationId xmlns:p14="http://schemas.microsoft.com/office/powerpoint/2010/main" val="440195292"/>
+        <p14:creationId xmlns:p14="http://schemas.microsoft.com/office/powerpoint/2010/main" val="2168008696"/>
       </p:ext>
     </p:extLst>
   </p:cSld>
   <p:clrMapOvr>
     <a:masterClrMapping/>
   </p:clrMapOvr>
+  <p:timing>
+    <p:tnLst>
+      <p:par>
+        <p:cTn id="1" dur="indefinite" restart="never" nodeType="tmRoot">
+          <p:childTnLst>
+            <p:seq concurrent="1" nextAc="seek">
+              <p:cTn id="2" dur="indefinite" nodeType="mainSeq">
+                <p:childTnLst>
+                  <p:par>
+                    <p:cTn id="3" fill="hold">
+                      <p:stCondLst>
+                        <p:cond delay="indefinite"/>
+                      </p:stCondLst>
+                      <p:childTnLst>
+                        <p:par>
+                          <p:cTn id="4" fill="hold">
+                            <p:stCondLst>
+                              <p:cond delay="0"/>
+                            </p:stCondLst>
+                            <p:childTnLst>
+                              <p:par>
+                                <p:cTn id="5" presetID="1" presetClass="entr" presetSubtype="0" fill="hold" nodeType="clickEffect">
+                                  <p:stCondLst>
+                                    <p:cond delay="0"/>
+                                  </p:stCondLst>
+                                  <p:childTnLst>
+                                    <p:set>
+                                      <p:cBhvr>
+                                        <p:cTn id="6" dur="1" fill="hold">
+                                          <p:stCondLst>
+                                            <p:cond delay="0"/>
+                                          </p:stCondLst>
+                                        </p:cTn>
+                                        <p:tgtEl>
+                                          <p:spTgt spid="6"/>
+                                        </p:tgtEl>
+                                        <p:attrNameLst>
+                                          <p:attrName>style.visibility</p:attrName>
+                                        </p:attrNameLst>
+                                      </p:cBhvr>
+                                      <p:to>
+                                        <p:strVal val="visible"/>
+                                      </p:to>
+                                    </p:set>
+                                  </p:childTnLst>
+                                </p:cTn>
+                              </p:par>
+                            </p:childTnLst>
+                          </p:cTn>
+                        </p:par>
+                      </p:childTnLst>
+                    </p:cTn>
+                  </p:par>
+                </p:childTnLst>
+              </p:cTn>
+              <p:prevCondLst>
+                <p:cond evt="onPrev" delay="0">
+                  <p:tgtEl>
+                    <p:sldTgt/>
+                  </p:tgtEl>
+                </p:cond>
+              </p:prevCondLst>
+              <p:nextCondLst>
+                <p:cond evt="onNext" delay="0">
+                  <p:tgtEl>
+                    <p:sldTgt/>
+                  </p:tgtEl>
+                </p:cond>
+              </p:nextCondLst>
+            </p:seq>
+          </p:childTnLst>
+        </p:cTn>
+      </p:par>
+    </p:tnLst>
+  </p:timing>
 </p:sld>
 </file>
 
@@ -6374,64 +7758,32 @@
             <p:ph type="title"/>
           </p:nvPr>
         </p:nvSpPr>
-        <p:spPr/>
-        <p:txBody>
-          <a:bodyPr/>
-          <a:lstStyle/>
-          <a:p>
-            <a:r>
-              <a:rPr lang="en-MY" dirty="0"/>
-              <a:t>Next Meeting</a:t>
-            </a:r>
-            <a:endParaRPr lang="en-US" dirty="0"/>
-          </a:p>
-        </p:txBody>
-      </p:sp>
-      <p:sp>
-        <p:nvSpPr>
-          <p:cNvPr id="6" name="TextBox 5">
-            <a:extLst>
-              <a:ext uri="{FF2B5EF4-FFF2-40B4-BE49-F238E27FC236}">
-                <a16:creationId xmlns:a16="http://schemas.microsoft.com/office/drawing/2014/main" id="{5CD50B1F-CE0D-FED6-70A2-576A7E6C8A86}"/>
-              </a:ext>
-            </a:extLst>
-          </p:cNvPr>
-          <p:cNvSpPr txBox="1"/>
-          <p:nvPr/>
-        </p:nvSpPr>
-        <p:spPr>
-          <a:xfrm>
-            <a:off x="839585" y="2014194"/>
-            <a:ext cx="10687130" cy="369332"/>
-          </a:xfrm>
-          <a:prstGeom prst="rect">
-            <a:avLst/>
-          </a:prstGeom>
-          <a:noFill/>
-        </p:spPr>
-        <p:txBody>
-          <a:bodyPr wrap="square" rtlCol="0">
-            <a:spAutoFit/>
+        <p:spPr>
+          <a:xfrm>
+            <a:off x="530470" y="484332"/>
+            <a:ext cx="9756530" cy="875546"/>
+          </a:xfrm>
+        </p:spPr>
+        <p:txBody>
+          <a:bodyPr>
+            <a:normAutofit/>
           </a:bodyPr>
           <a:lstStyle/>
           <a:p>
-            <a:pPr marL="342900" indent="-342900">
-              <a:buAutoNum type="arabicPeriod"/>
-            </a:pPr>
-            <a:r>
-              <a:rPr lang="en-MY" dirty="0"/>
-              <a:t>Research paper (?)</a:t>
-            </a:r>
-            <a:endParaRPr lang="en-US" dirty="0"/>
-          </a:p>
-        </p:txBody>
-      </p:sp>
-      <p:sp>
-        <p:nvSpPr>
-          <p:cNvPr id="3" name="Slide Number Placeholder 2">
-            <a:extLst>
-              <a:ext uri="{FF2B5EF4-FFF2-40B4-BE49-F238E27FC236}">
-                <a16:creationId xmlns:a16="http://schemas.microsoft.com/office/drawing/2014/main" id="{91D23FCB-73D4-C331-2251-938DEFF248B4}"/>
+            <a:r>
+              <a:rPr lang="en-MY" sz="2800" dirty="0"/>
+              <a:t>Difficulties for Shoulder Risk</a:t>
+            </a:r>
+            <a:endParaRPr lang="en-US" sz="2800" dirty="0"/>
+          </a:p>
+        </p:txBody>
+      </p:sp>
+      <p:sp>
+        <p:nvSpPr>
+          <p:cNvPr id="4" name="Slide Number Placeholder 3">
+            <a:extLst>
+              <a:ext uri="{FF2B5EF4-FFF2-40B4-BE49-F238E27FC236}">
+                <a16:creationId xmlns:a16="http://schemas.microsoft.com/office/drawing/2014/main" id="{CE53EFF4-FAB5-738D-DCCA-789DE804A66E}"/>
               </a:ext>
             </a:extLst>
           </p:cNvPr>
@@ -6442,7 +7794,12 @@
             <p:ph type="sldNum" sz="quarter" idx="12"/>
           </p:nvPr>
         </p:nvSpPr>
-        <p:spPr/>
+        <p:spPr>
+          <a:xfrm>
+            <a:off x="10287000" y="6035040"/>
+            <a:ext cx="838200" cy="365760"/>
+          </a:xfrm>
+        </p:spPr>
         <p:txBody>
           <a:bodyPr/>
           <a:lstStyle/>
@@ -6455,10 +7812,196 @@
           </a:p>
         </p:txBody>
       </p:sp>
+      <p:sp>
+        <p:nvSpPr>
+          <p:cNvPr id="153" name="TextBox 152">
+            <a:extLst>
+              <a:ext uri="{FF2B5EF4-FFF2-40B4-BE49-F238E27FC236}">
+                <a16:creationId xmlns:a16="http://schemas.microsoft.com/office/drawing/2014/main" id="{2806D040-4630-3135-9B3F-0064C65A4C2A}"/>
+              </a:ext>
+            </a:extLst>
+          </p:cNvPr>
+          <p:cNvSpPr txBox="1"/>
+          <p:nvPr/>
+        </p:nvSpPr>
+        <p:spPr>
+          <a:xfrm>
+            <a:off x="698987" y="1392622"/>
+            <a:ext cx="10883413" cy="5078313"/>
+          </a:xfrm>
+          <a:prstGeom prst="rect">
+            <a:avLst/>
+          </a:prstGeom>
+          <a:noFill/>
+        </p:spPr>
+        <p:txBody>
+          <a:bodyPr wrap="square" rtlCol="0">
+            <a:spAutoFit/>
+          </a:bodyPr>
+          <a:lstStyle/>
+          <a:p>
+            <a:pPr marL="342900" indent="-342900">
+              <a:buFont typeface="+mj-lt"/>
+              <a:buAutoNum type="arabicPeriod"/>
+            </a:pPr>
+            <a:r>
+              <a:rPr lang="en-MY" dirty="0"/>
+              <a:t>More forces need to be consider (</a:t>
+            </a:r>
+            <a:r>
+              <a:rPr lang="en-MY" i="1" dirty="0"/>
+              <a:t>tensile force, compressive force, shear force</a:t>
+            </a:r>
+            <a:r>
+              <a:rPr lang="en-MY" dirty="0"/>
+              <a:t>), each force has different direction. </a:t>
+            </a:r>
+          </a:p>
+          <a:p>
+            <a:pPr marL="342900" indent="-342900">
+              <a:buFont typeface="+mj-lt"/>
+              <a:buAutoNum type="arabicPeriod"/>
+            </a:pPr>
+            <a:endParaRPr lang="en-MY" dirty="0"/>
+          </a:p>
+          <a:p>
+            <a:pPr marL="342900" indent="-342900">
+              <a:buFont typeface="+mj-lt"/>
+              <a:buAutoNum type="arabicPeriod"/>
+            </a:pPr>
+            <a:r>
+              <a:rPr lang="en-MY" dirty="0"/>
+              <a:t>The current research doesn’t have a golden standard for the maximum acceptable force for all the 3 directions. Current way to deal with shoulder risk is as shown in the figure below, we need to somehow apply a qualitative way (select a category) for the first step</a:t>
+            </a:r>
+            <a:r>
+              <a:rPr lang="en-MY" b="1" dirty="0"/>
+              <a:t> </a:t>
+            </a:r>
+          </a:p>
+          <a:p>
+            <a:pPr marL="342900" indent="-342900">
+              <a:buFont typeface="+mj-lt"/>
+              <a:buAutoNum type="arabicPeriod"/>
+            </a:pPr>
+            <a:endParaRPr lang="en-MY" b="1" dirty="0"/>
+          </a:p>
+          <a:p>
+            <a:pPr marL="342900" indent="-342900">
+              <a:buFont typeface="+mj-lt"/>
+              <a:buAutoNum type="arabicPeriod"/>
+            </a:pPr>
+            <a:endParaRPr lang="en-MY" b="1" dirty="0"/>
+          </a:p>
+          <a:p>
+            <a:pPr marL="342900" indent="-342900">
+              <a:buFont typeface="+mj-lt"/>
+              <a:buAutoNum type="arabicPeriod"/>
+            </a:pPr>
+            <a:endParaRPr lang="en-MY" b="1" dirty="0"/>
+          </a:p>
+          <a:p>
+            <a:pPr marL="342900" indent="-342900">
+              <a:buFont typeface="+mj-lt"/>
+              <a:buAutoNum type="arabicPeriod"/>
+            </a:pPr>
+            <a:endParaRPr lang="en-MY" b="1" dirty="0"/>
+          </a:p>
+          <a:p>
+            <a:pPr marL="342900" indent="-342900">
+              <a:buFont typeface="+mj-lt"/>
+              <a:buAutoNum type="arabicPeriod"/>
+            </a:pPr>
+            <a:endParaRPr lang="en-MY" b="1" dirty="0"/>
+          </a:p>
+          <a:p>
+            <a:pPr marL="342900" indent="-342900">
+              <a:buFont typeface="+mj-lt"/>
+              <a:buAutoNum type="arabicPeriod"/>
+            </a:pPr>
+            <a:endParaRPr lang="en-MY" b="1" dirty="0"/>
+          </a:p>
+          <a:p>
+            <a:pPr marL="342900" indent="-342900">
+              <a:buFont typeface="+mj-lt"/>
+              <a:buAutoNum type="arabicPeriod"/>
+            </a:pPr>
+            <a:endParaRPr lang="en-MY" b="1" dirty="0"/>
+          </a:p>
+          <a:p>
+            <a:pPr marL="342900" indent="-342900">
+              <a:buFont typeface="+mj-lt"/>
+              <a:buAutoNum type="arabicPeriod"/>
+            </a:pPr>
+            <a:endParaRPr lang="en-MY" b="1" dirty="0"/>
+          </a:p>
+          <a:p>
+            <a:pPr marL="342900" indent="-342900">
+              <a:buFont typeface="+mj-lt"/>
+              <a:buAutoNum type="arabicPeriod"/>
+            </a:pPr>
+            <a:r>
+              <a:rPr lang="en-MY" dirty="0"/>
+              <a:t>Even though we can find, the data doesn’t make sense to us.</a:t>
+            </a:r>
+            <a:br>
+              <a:rPr lang="en-MY" dirty="0"/>
+            </a:br>
+            <a:endParaRPr lang="en-MY" dirty="0"/>
+          </a:p>
+          <a:p>
+            <a:pPr marL="342900" indent="-342900">
+              <a:buFont typeface="+mj-lt"/>
+              <a:buAutoNum type="arabicPeriod" startAt="4"/>
+            </a:pPr>
+            <a:r>
+              <a:rPr lang="en-MY" dirty="0"/>
+              <a:t>Due to the time limitation and the complexity, I suggest we can just </a:t>
+            </a:r>
+            <a:r>
+              <a:rPr lang="en-MY" b="1" dirty="0"/>
+              <a:t>focus on the low back risk </a:t>
+            </a:r>
+            <a:r>
+              <a:rPr lang="en-MY" dirty="0"/>
+              <a:t>at this stage.</a:t>
+            </a:r>
+          </a:p>
+        </p:txBody>
+      </p:sp>
+      <p:pic>
+        <p:nvPicPr>
+          <p:cNvPr id="3" name="Picture 2">
+            <a:extLst>
+              <a:ext uri="{FF2B5EF4-FFF2-40B4-BE49-F238E27FC236}">
+                <a16:creationId xmlns:a16="http://schemas.microsoft.com/office/drawing/2014/main" id="{252B47E7-5559-ECBB-E11A-8652EFA7B9AC}"/>
+              </a:ext>
+            </a:extLst>
+          </p:cNvPr>
+          <p:cNvPicPr>
+            <a:picLocks noChangeAspect="1"/>
+          </p:cNvPicPr>
+          <p:nvPr/>
+        </p:nvPicPr>
+        <p:blipFill>
+          <a:blip r:embed="rId2"/>
+          <a:stretch>
+            <a:fillRect/>
+          </a:stretch>
+        </p:blipFill>
+        <p:spPr>
+          <a:xfrm>
+            <a:off x="1094301" y="3196014"/>
+            <a:ext cx="4641153" cy="2016066"/>
+          </a:xfrm>
+          <a:prstGeom prst="rect">
+            <a:avLst/>
+          </a:prstGeom>
+        </p:spPr>
+      </p:pic>
     </p:spTree>
     <p:extLst>
       <p:ext uri="{BB962C8B-B14F-4D97-AF65-F5344CB8AC3E}">
-        <p14:creationId xmlns:p14="http://schemas.microsoft.com/office/powerpoint/2010/main" val="2699799663"/>
+        <p14:creationId xmlns:p14="http://schemas.microsoft.com/office/powerpoint/2010/main" val="1112897419"/>
       </p:ext>
     </p:extLst>
   </p:cSld>

</xml_diff>